<commit_message>
Fixed question numbering and added "train the trainer" notes
</commit_message>
<xml_diff>
--- a/Lessons/Lesson_II/Lesson_II_Questions.pptx
+++ b/Lessons/Lesson_II/Lesson_II_Questions.pptx
@@ -64,8 +64,8 @@
         </p:nvSpPr>
         <p:spPr>
           <a:xfrm>
-            <a:off x="457200" y="205920"/>
-            <a:ext cx="8228880" cy="856440"/>
+            <a:off x="457200" y="205200"/>
+            <a:ext cx="8229240" cy="858600"/>
           </a:xfrm>
           <a:prstGeom prst="rect">
             <a:avLst/>
@@ -91,8 +91,8 @@
         </p:nvSpPr>
         <p:spPr>
           <a:xfrm>
-            <a:off x="457200" y="1200240"/>
-            <a:ext cx="8228880" cy="1776600"/>
+            <a:off x="457200" y="1203480"/>
+            <a:ext cx="8229240" cy="1422720"/>
           </a:xfrm>
           <a:prstGeom prst="rect">
             <a:avLst/>
@@ -117,8 +117,8 @@
         </p:nvSpPr>
         <p:spPr>
           <a:xfrm>
-            <a:off x="457200" y="3146040"/>
-            <a:ext cx="8228880" cy="1776600"/>
+            <a:off x="457200" y="2761920"/>
+            <a:ext cx="8229240" cy="1422720"/>
           </a:xfrm>
           <a:prstGeom prst="rect">
             <a:avLst/>
@@ -165,8 +165,8 @@
         </p:nvSpPr>
         <p:spPr>
           <a:xfrm>
-            <a:off x="457200" y="205920"/>
-            <a:ext cx="8228880" cy="856440"/>
+            <a:off x="457200" y="205200"/>
+            <a:ext cx="8229240" cy="858600"/>
           </a:xfrm>
           <a:prstGeom prst="rect">
             <a:avLst/>
@@ -192,8 +192,8 @@
         </p:nvSpPr>
         <p:spPr>
           <a:xfrm>
-            <a:off x="457200" y="1200240"/>
-            <a:ext cx="4015440" cy="1776600"/>
+            <a:off x="457200" y="1203480"/>
+            <a:ext cx="4015800" cy="1422720"/>
           </a:xfrm>
           <a:prstGeom prst="rect">
             <a:avLst/>
@@ -218,8 +218,8 @@
         </p:nvSpPr>
         <p:spPr>
           <a:xfrm>
-            <a:off x="4673880" y="1200240"/>
-            <a:ext cx="4015440" cy="1776600"/>
+            <a:off x="4674240" y="1203480"/>
+            <a:ext cx="4015800" cy="1422720"/>
           </a:xfrm>
           <a:prstGeom prst="rect">
             <a:avLst/>
@@ -244,8 +244,8 @@
         </p:nvSpPr>
         <p:spPr>
           <a:xfrm>
-            <a:off x="4673880" y="3146040"/>
-            <a:ext cx="4015440" cy="1776600"/>
+            <a:off x="4674240" y="2761920"/>
+            <a:ext cx="4015800" cy="1422720"/>
           </a:xfrm>
           <a:prstGeom prst="rect">
             <a:avLst/>
@@ -270,8 +270,8 @@
         </p:nvSpPr>
         <p:spPr>
           <a:xfrm>
-            <a:off x="457200" y="3146040"/>
-            <a:ext cx="4015440" cy="1776600"/>
+            <a:off x="457200" y="2761920"/>
+            <a:ext cx="4015800" cy="1422720"/>
           </a:xfrm>
           <a:prstGeom prst="rect">
             <a:avLst/>
@@ -318,8 +318,8 @@
         </p:nvSpPr>
         <p:spPr>
           <a:xfrm>
-            <a:off x="457200" y="205920"/>
-            <a:ext cx="8228880" cy="856440"/>
+            <a:off x="457200" y="205200"/>
+            <a:ext cx="8229240" cy="858600"/>
           </a:xfrm>
           <a:prstGeom prst="rect">
             <a:avLst/>
@@ -345,8 +345,8 @@
         </p:nvSpPr>
         <p:spPr>
           <a:xfrm>
-            <a:off x="457200" y="1200240"/>
-            <a:ext cx="8228880" cy="3724920"/>
+            <a:off x="457200" y="1203480"/>
+            <a:ext cx="8229240" cy="2982960"/>
           </a:xfrm>
           <a:prstGeom prst="rect">
             <a:avLst/>
@@ -371,8 +371,8 @@
         </p:nvSpPr>
         <p:spPr>
           <a:xfrm>
-            <a:off x="457200" y="1200240"/>
-            <a:ext cx="8228880" cy="3724920"/>
+            <a:off x="457200" y="1203480"/>
+            <a:ext cx="8229240" cy="2982960"/>
           </a:xfrm>
           <a:prstGeom prst="rect">
             <a:avLst/>
@@ -397,8 +397,8 @@
         </p:blipFill>
         <p:spPr>
           <a:xfrm>
-            <a:off x="2237400" y="1199880"/>
-            <a:ext cx="4668480" cy="3724920"/>
+            <a:off x="2702160" y="1203480"/>
+            <a:ext cx="3738600" cy="2982960"/>
           </a:xfrm>
           <a:prstGeom prst="rect">
             <a:avLst/>
@@ -420,8 +420,8 @@
         </p:blipFill>
         <p:spPr>
           <a:xfrm>
-            <a:off x="2237400" y="1199880"/>
-            <a:ext cx="4668480" cy="3724920"/>
+            <a:off x="2702160" y="1203480"/>
+            <a:ext cx="3738600" cy="2982960"/>
           </a:xfrm>
           <a:prstGeom prst="rect">
             <a:avLst/>
@@ -465,8 +465,8 @@
         </p:nvSpPr>
         <p:spPr>
           <a:xfrm>
-            <a:off x="457200" y="205920"/>
-            <a:ext cx="8228880" cy="856440"/>
+            <a:off x="457200" y="205200"/>
+            <a:ext cx="8229240" cy="858600"/>
           </a:xfrm>
           <a:prstGeom prst="rect">
             <a:avLst/>
@@ -492,8 +492,8 @@
         </p:nvSpPr>
         <p:spPr>
           <a:xfrm>
-            <a:off x="457200" y="1200240"/>
-            <a:ext cx="8228880" cy="3724920"/>
+            <a:off x="457200" y="1203480"/>
+            <a:ext cx="8229240" cy="2982960"/>
           </a:xfrm>
           <a:prstGeom prst="rect">
             <a:avLst/>
@@ -541,8 +541,8 @@
         </p:nvSpPr>
         <p:spPr>
           <a:xfrm>
-            <a:off x="457200" y="205920"/>
-            <a:ext cx="8228880" cy="856440"/>
+            <a:off x="457200" y="205200"/>
+            <a:ext cx="8229240" cy="858600"/>
           </a:xfrm>
           <a:prstGeom prst="rect">
             <a:avLst/>
@@ -568,8 +568,8 @@
         </p:nvSpPr>
         <p:spPr>
           <a:xfrm>
-            <a:off x="457200" y="1200240"/>
-            <a:ext cx="8228880" cy="3724920"/>
+            <a:off x="457200" y="1203480"/>
+            <a:ext cx="8229240" cy="2982960"/>
           </a:xfrm>
           <a:prstGeom prst="rect">
             <a:avLst/>
@@ -616,8 +616,8 @@
         </p:nvSpPr>
         <p:spPr>
           <a:xfrm>
-            <a:off x="457200" y="205920"/>
-            <a:ext cx="8228880" cy="856440"/>
+            <a:off x="457200" y="205200"/>
+            <a:ext cx="8229240" cy="858600"/>
           </a:xfrm>
           <a:prstGeom prst="rect">
             <a:avLst/>
@@ -643,8 +643,8 @@
         </p:nvSpPr>
         <p:spPr>
           <a:xfrm>
-            <a:off x="457200" y="1200240"/>
-            <a:ext cx="4015440" cy="3724920"/>
+            <a:off x="457200" y="1203480"/>
+            <a:ext cx="4015800" cy="2982960"/>
           </a:xfrm>
           <a:prstGeom prst="rect">
             <a:avLst/>
@@ -669,8 +669,8 @@
         </p:nvSpPr>
         <p:spPr>
           <a:xfrm>
-            <a:off x="4673880" y="1200240"/>
-            <a:ext cx="4015440" cy="3724920"/>
+            <a:off x="4674240" y="1203480"/>
+            <a:ext cx="4015800" cy="2982960"/>
           </a:xfrm>
           <a:prstGeom prst="rect">
             <a:avLst/>
@@ -717,8 +717,8 @@
         </p:nvSpPr>
         <p:spPr>
           <a:xfrm>
-            <a:off x="457200" y="205920"/>
-            <a:ext cx="8228880" cy="856440"/>
+            <a:off x="457200" y="205200"/>
+            <a:ext cx="8229240" cy="858600"/>
           </a:xfrm>
           <a:prstGeom prst="rect">
             <a:avLst/>
@@ -766,8 +766,8 @@
         </p:nvSpPr>
         <p:spPr>
           <a:xfrm>
-            <a:off x="457200" y="205920"/>
-            <a:ext cx="8228880" cy="3971160"/>
+            <a:off x="457200" y="205200"/>
+            <a:ext cx="8229240" cy="3981240"/>
           </a:xfrm>
           <a:prstGeom prst="rect">
             <a:avLst/>
@@ -815,8 +815,8 @@
         </p:nvSpPr>
         <p:spPr>
           <a:xfrm>
-            <a:off x="457200" y="205920"/>
-            <a:ext cx="8228880" cy="856440"/>
+            <a:off x="457200" y="205200"/>
+            <a:ext cx="8229240" cy="858600"/>
           </a:xfrm>
           <a:prstGeom prst="rect">
             <a:avLst/>
@@ -842,8 +842,8 @@
         </p:nvSpPr>
         <p:spPr>
           <a:xfrm>
-            <a:off x="457200" y="1200240"/>
-            <a:ext cx="4015440" cy="1776600"/>
+            <a:off x="457200" y="1203480"/>
+            <a:ext cx="4015800" cy="1422720"/>
           </a:xfrm>
           <a:prstGeom prst="rect">
             <a:avLst/>
@@ -868,8 +868,8 @@
         </p:nvSpPr>
         <p:spPr>
           <a:xfrm>
-            <a:off x="457200" y="3146040"/>
-            <a:ext cx="4015440" cy="1776600"/>
+            <a:off x="457200" y="2761920"/>
+            <a:ext cx="4015800" cy="1422720"/>
           </a:xfrm>
           <a:prstGeom prst="rect">
             <a:avLst/>
@@ -894,8 +894,8 @@
         </p:nvSpPr>
         <p:spPr>
           <a:xfrm>
-            <a:off x="4673880" y="1200240"/>
-            <a:ext cx="4015440" cy="3724920"/>
+            <a:off x="4674240" y="1203480"/>
+            <a:ext cx="4015800" cy="2982960"/>
           </a:xfrm>
           <a:prstGeom prst="rect">
             <a:avLst/>
@@ -942,8 +942,8 @@
         </p:nvSpPr>
         <p:spPr>
           <a:xfrm>
-            <a:off x="457200" y="205920"/>
-            <a:ext cx="8228880" cy="856440"/>
+            <a:off x="457200" y="205200"/>
+            <a:ext cx="8229240" cy="858600"/>
           </a:xfrm>
           <a:prstGeom prst="rect">
             <a:avLst/>
@@ -969,8 +969,8 @@
         </p:nvSpPr>
         <p:spPr>
           <a:xfrm>
-            <a:off x="457200" y="1200240"/>
-            <a:ext cx="4015440" cy="3724920"/>
+            <a:off x="457200" y="1203480"/>
+            <a:ext cx="4015800" cy="2982960"/>
           </a:xfrm>
           <a:prstGeom prst="rect">
             <a:avLst/>
@@ -995,8 +995,8 @@
         </p:nvSpPr>
         <p:spPr>
           <a:xfrm>
-            <a:off x="4673880" y="1200240"/>
-            <a:ext cx="4015440" cy="1776600"/>
+            <a:off x="4674240" y="1203480"/>
+            <a:ext cx="4015800" cy="1422720"/>
           </a:xfrm>
           <a:prstGeom prst="rect">
             <a:avLst/>
@@ -1021,8 +1021,8 @@
         </p:nvSpPr>
         <p:spPr>
           <a:xfrm>
-            <a:off x="4673880" y="3146040"/>
-            <a:ext cx="4015440" cy="1776600"/>
+            <a:off x="4674240" y="2761920"/>
+            <a:ext cx="4015800" cy="1422720"/>
           </a:xfrm>
           <a:prstGeom prst="rect">
             <a:avLst/>
@@ -1069,8 +1069,8 @@
         </p:nvSpPr>
         <p:spPr>
           <a:xfrm>
-            <a:off x="457200" y="205920"/>
-            <a:ext cx="8228880" cy="856440"/>
+            <a:off x="457200" y="205200"/>
+            <a:ext cx="8229240" cy="858600"/>
           </a:xfrm>
           <a:prstGeom prst="rect">
             <a:avLst/>
@@ -1096,8 +1096,8 @@
         </p:nvSpPr>
         <p:spPr>
           <a:xfrm>
-            <a:off x="457200" y="1200240"/>
-            <a:ext cx="4015440" cy="1776600"/>
+            <a:off x="457200" y="1203480"/>
+            <a:ext cx="4015800" cy="1422720"/>
           </a:xfrm>
           <a:prstGeom prst="rect">
             <a:avLst/>
@@ -1122,8 +1122,8 @@
         </p:nvSpPr>
         <p:spPr>
           <a:xfrm>
-            <a:off x="4673880" y="1200240"/>
-            <a:ext cx="4015440" cy="1776600"/>
+            <a:off x="4674240" y="1203480"/>
+            <a:ext cx="4015800" cy="1422720"/>
           </a:xfrm>
           <a:prstGeom prst="rect">
             <a:avLst/>
@@ -1148,8 +1148,8 @@
         </p:nvSpPr>
         <p:spPr>
           <a:xfrm>
-            <a:off x="457200" y="3146040"/>
-            <a:ext cx="8228880" cy="1776600"/>
+            <a:off x="457200" y="2761920"/>
+            <a:ext cx="8229240" cy="1422720"/>
           </a:xfrm>
           <a:prstGeom prst="rect">
             <a:avLst/>
@@ -1203,8 +1203,8 @@
         </p:nvSpPr>
         <p:spPr>
           <a:xfrm>
-            <a:off x="457200" y="205920"/>
-            <a:ext cx="8228880" cy="856440"/>
+            <a:off x="457200" y="205200"/>
+            <a:ext cx="8229240" cy="858600"/>
           </a:xfrm>
           <a:prstGeom prst="rect">
             <a:avLst/>
@@ -1214,6 +1214,12 @@
           <a:bodyPr lIns="0" rIns="0" tIns="0" bIns="0" anchor="ctr"/>
           <a:p>
             <a:pPr algn="ctr"/>
+            <a:r>
+              <a:rPr lang="en-AU" sz="4400" spc="-1">
+                <a:latin typeface="Arial"/>
+              </a:rPr>
+              <a:t>Click to edit the title text format</a:t>
+            </a:r>
             <a:endParaRPr/>
           </a:p>
         </p:txBody>
@@ -1230,8 +1236,8 @@
         </p:nvSpPr>
         <p:spPr>
           <a:xfrm>
-            <a:off x="457200" y="1200240"/>
-            <a:ext cx="8228880" cy="3724920"/>
+            <a:off x="457200" y="1203480"/>
+            <a:ext cx="8229240" cy="2982960"/>
           </a:xfrm>
           <a:prstGeom prst="rect">
             <a:avLst/>
@@ -1249,7 +1255,7 @@
               <a:buChar char=""/>
             </a:pPr>
             <a:r>
-              <a:rPr lang="en-AU" sz="1800" spc="-1">
+              <a:rPr lang="en-AU" sz="3200" spc="-1">
                 <a:latin typeface="Arial"/>
               </a:rPr>
               <a:t>Click to edit the outline text format</a:t>
@@ -1266,7 +1272,7 @@
               <a:buChar char=""/>
             </a:pPr>
             <a:r>
-              <a:rPr lang="en-AU" sz="1800" spc="-1">
+              <a:rPr lang="en-AU" sz="2800" spc="-1">
                 <a:latin typeface="Arial"/>
               </a:rPr>
               <a:t>Second Outline Level</a:t>
@@ -1283,7 +1289,7 @@
               <a:buChar char=""/>
             </a:pPr>
             <a:r>
-              <a:rPr lang="en-AU" sz="1800" spc="-1">
+              <a:rPr lang="en-AU" sz="2400" spc="-1">
                 <a:latin typeface="Arial"/>
               </a:rPr>
               <a:t>Third Outline Level</a:t>
@@ -1300,7 +1306,7 @@
               <a:buChar char=""/>
             </a:pPr>
             <a:r>
-              <a:rPr lang="en-AU" sz="1800" spc="-1">
+              <a:rPr lang="en-AU" sz="2000" spc="-1">
                 <a:latin typeface="Arial"/>
               </a:rPr>
               <a:t>Fourth Outline Level</a:t>
@@ -1317,7 +1323,7 @@
               <a:buChar char=""/>
             </a:pPr>
             <a:r>
-              <a:rPr lang="en-AU" sz="1800" spc="-1">
+              <a:rPr lang="en-AU" sz="2000" spc="-1">
                 <a:latin typeface="Arial"/>
               </a:rPr>
               <a:t>Fifth Outline Level</a:t>
@@ -1334,7 +1340,7 @@
               <a:buChar char=""/>
             </a:pPr>
             <a:r>
-              <a:rPr lang="en-AU" sz="1800" spc="-1">
+              <a:rPr lang="en-AU" sz="2000" spc="-1">
                 <a:latin typeface="Arial"/>
               </a:rPr>
               <a:t>Sixth Outline Level</a:t>
@@ -1351,7 +1357,7 @@
               <a:buChar char=""/>
             </a:pPr>
             <a:r>
-              <a:rPr lang="en-AU" sz="1800" spc="-1">
+              <a:rPr lang="en-AU" sz="2000" spc="-1">
                 <a:latin typeface="Arial"/>
               </a:rPr>
               <a:t>Seventh Outline Level</a:t>
@@ -1406,7 +1412,7 @@
         <p:spPr>
           <a:xfrm>
             <a:off x="457200" y="205920"/>
-            <a:ext cx="8228880" cy="856800"/>
+            <a:ext cx="8228520" cy="856440"/>
           </a:xfrm>
           <a:prstGeom prst="rect">
             <a:avLst/>
@@ -1458,7 +1464,7 @@
         <p:spPr>
           <a:xfrm>
             <a:off x="457200" y="1200240"/>
-            <a:ext cx="8228880" cy="3724920"/>
+            <a:ext cx="8228520" cy="3724560"/>
           </a:xfrm>
           <a:prstGeom prst="rect">
             <a:avLst/>
@@ -1602,7 +1608,7 @@
         <p:spPr>
           <a:xfrm>
             <a:off x="0" y="0"/>
-            <a:ext cx="2999160" cy="2999160"/>
+            <a:ext cx="2998800" cy="2998800"/>
           </a:xfrm>
           <a:prstGeom prst="rect">
             <a:avLst/>
@@ -1703,7 +1709,7 @@
         <p:spPr>
           <a:xfrm>
             <a:off x="457200" y="205920"/>
-            <a:ext cx="8228880" cy="856800"/>
+            <a:ext cx="8228520" cy="856440"/>
           </a:xfrm>
           <a:prstGeom prst="rect">
             <a:avLst/>
@@ -1740,7 +1746,7 @@
                 <a:latin typeface="Arial"/>
                 <a:ea typeface="Arial"/>
               </a:rPr>
-              <a:t>Question 2</a:t>
+              <a:t>Question 1</a:t>
             </a:r>
             <a:endParaRPr/>
           </a:p>
@@ -1755,7 +1761,7 @@
         <p:spPr>
           <a:xfrm>
             <a:off x="457200" y="1200240"/>
-            <a:ext cx="8228880" cy="3724920"/>
+            <a:ext cx="8228520" cy="3724560"/>
           </a:xfrm>
           <a:prstGeom prst="rect">
             <a:avLst/>
@@ -1797,7 +1803,7 @@
             <a:endParaRPr/>
           </a:p>
           <a:p>
-            <a:pPr marL="216000" indent="-216000">
+            <a:pPr marL="216000" indent="-215640">
               <a:lnSpc>
                 <a:spcPct val="120000"/>
               </a:lnSpc>
@@ -1822,7 +1828,7 @@
             <a:endParaRPr/>
           </a:p>
           <a:p>
-            <a:pPr marL="216000" indent="-216000">
+            <a:pPr marL="216000" indent="-215640">
               <a:lnSpc>
                 <a:spcPct val="120000"/>
               </a:lnSpc>
@@ -1847,7 +1853,7 @@
             <a:endParaRPr/>
           </a:p>
           <a:p>
-            <a:pPr marL="216000" indent="-216000">
+            <a:pPr marL="216000" indent="-215640">
               <a:lnSpc>
                 <a:spcPct val="120000"/>
               </a:lnSpc>
@@ -1872,7 +1878,7 @@
             <a:endParaRPr/>
           </a:p>
           <a:p>
-            <a:pPr marL="216000" indent="-216000">
+            <a:pPr marL="216000" indent="-215640">
               <a:lnSpc>
                 <a:spcPct val="120000"/>
               </a:lnSpc>
@@ -1897,7 +1903,7 @@
             <a:endParaRPr/>
           </a:p>
           <a:p>
-            <a:pPr marL="216000" indent="-216000">
+            <a:pPr marL="216000" indent="-215640">
               <a:lnSpc>
                 <a:spcPct val="115000"/>
               </a:lnSpc>

</xml_diff>

<commit_message>
Updated with the points from the walk through
</commit_message>
<xml_diff>
--- a/Lessons/Lesson_II/Lesson_II_Questions.pptx
+++ b/Lessons/Lesson_II/Lesson_II_Questions.pptx
@@ -3,10 +3,14 @@
 <p:presentation xmlns:a="http://schemas.openxmlformats.org/drawingml/2006/main" xmlns:p="http://schemas.openxmlformats.org/presentationml/2006/main" xmlns:r="http://schemas.openxmlformats.org/officeDocument/2006/relationships">
   <p:sldMasterIdLst>
     <p:sldMasterId id="2147483648" r:id="rId2"/>
+    <p:sldMasterId id="2147483661" r:id="rId3"/>
   </p:sldMasterIdLst>
   <p:sldIdLst>
-    <p:sldId id="256" r:id="rId3"/>
-    <p:sldId id="257" r:id="rId4"/>
+    <p:sldId id="256" r:id="rId4"/>
+    <p:sldId id="257" r:id="rId5"/>
+    <p:sldId id="258" r:id="rId6"/>
+    <p:sldId id="259" r:id="rId7"/>
+    <p:sldId id="260" r:id="rId8"/>
   </p:sldIdLst>
   <p:sldSz cx="9144000" cy="5143500"/>
   <p:notesSz cx="7559675" cy="10691812"/>
@@ -436,6 +440,505 @@
 </p:sldLayout>
 </file>
 
+<file path=ppt/slideLayouts/slideLayout13.xml><?xml version="1.0" encoding="utf-8"?>
+<p:sldLayout xmlns:a="http://schemas.openxmlformats.org/drawingml/2006/main" xmlns:p="http://schemas.openxmlformats.org/presentationml/2006/main" xmlns:r="http://schemas.openxmlformats.org/officeDocument/2006/relationships" type="blank" preserve="1">
+  <p:cSld name="Blank Slide">
+    <p:spTree>
+      <p:nvGrpSpPr>
+        <p:cNvPr id="1" name=""/>
+        <p:cNvGrpSpPr/>
+        <p:nvPr/>
+      </p:nvGrpSpPr>
+      <p:grpSpPr>
+        <a:xfrm>
+          <a:off x="0" y="0"/>
+          <a:ext cx="0" cy="0"/>
+          <a:chOff x="0" y="0"/>
+          <a:chExt cx="0" cy="0"/>
+        </a:xfrm>
+      </p:grpSpPr>
+    </p:spTree>
+  </p:cSld>
+</p:sldLayout>
+</file>
+
+<file path=ppt/slideLayouts/slideLayout14.xml><?xml version="1.0" encoding="utf-8"?>
+<p:sldLayout xmlns:a="http://schemas.openxmlformats.org/drawingml/2006/main" xmlns:p="http://schemas.openxmlformats.org/presentationml/2006/main" xmlns:r="http://schemas.openxmlformats.org/officeDocument/2006/relationships" type="tx" preserve="1">
+  <p:cSld name="Title Slide">
+    <p:spTree>
+      <p:nvGrpSpPr>
+        <p:cNvPr id="1" name=""/>
+        <p:cNvGrpSpPr/>
+        <p:nvPr/>
+      </p:nvGrpSpPr>
+      <p:grpSpPr>
+        <a:xfrm>
+          <a:off x="0" y="0"/>
+          <a:ext cx="0" cy="0"/>
+          <a:chOff x="0" y="0"/>
+          <a:chExt cx="0" cy="0"/>
+        </a:xfrm>
+      </p:grpSpPr>
+      <p:sp>
+        <p:nvSpPr>
+          <p:cNvPr id="38" name="PlaceHolder 1"/>
+          <p:cNvSpPr>
+            <a:spLocks noGrp="1"/>
+          </p:cNvSpPr>
+          <p:nvPr>
+            <p:ph type="title"/>
+          </p:nvPr>
+        </p:nvSpPr>
+        <p:spPr>
+          <a:xfrm>
+            <a:off x="457200" y="205200"/>
+            <a:ext cx="8229240" cy="858600"/>
+          </a:xfrm>
+          <a:prstGeom prst="rect">
+            <a:avLst/>
+          </a:prstGeom>
+        </p:spPr>
+        <p:txBody>
+          <a:bodyPr lIns="0" rIns="0" tIns="0" bIns="0" anchor="ctr"/>
+          <a:p>
+            <a:pPr algn="ctr"/>
+            <a:endParaRPr/>
+          </a:p>
+        </p:txBody>
+      </p:sp>
+      <p:sp>
+        <p:nvSpPr>
+          <p:cNvPr id="39" name="PlaceHolder 2"/>
+          <p:cNvSpPr>
+            <a:spLocks noGrp="1"/>
+          </p:cNvSpPr>
+          <p:nvPr>
+            <p:ph type="subTitle"/>
+          </p:nvPr>
+        </p:nvSpPr>
+        <p:spPr>
+          <a:xfrm>
+            <a:off x="457200" y="1203480"/>
+            <a:ext cx="8229240" cy="2982960"/>
+          </a:xfrm>
+          <a:prstGeom prst="rect">
+            <a:avLst/>
+          </a:prstGeom>
+        </p:spPr>
+        <p:txBody>
+          <a:bodyPr lIns="0" rIns="0" tIns="0" bIns="0" anchor="ctr"/>
+          <a:p>
+            <a:pPr algn="ctr"/>
+            <a:endParaRPr/>
+          </a:p>
+        </p:txBody>
+      </p:sp>
+    </p:spTree>
+  </p:cSld>
+</p:sldLayout>
+</file>
+
+<file path=ppt/slideLayouts/slideLayout15.xml><?xml version="1.0" encoding="utf-8"?>
+<p:sldLayout xmlns:a="http://schemas.openxmlformats.org/drawingml/2006/main" xmlns:p="http://schemas.openxmlformats.org/presentationml/2006/main" xmlns:r="http://schemas.openxmlformats.org/officeDocument/2006/relationships" type="obj" preserve="1">
+  <p:cSld name="Title, Content">
+    <p:spTree>
+      <p:nvGrpSpPr>
+        <p:cNvPr id="1" name=""/>
+        <p:cNvGrpSpPr/>
+        <p:nvPr/>
+      </p:nvGrpSpPr>
+      <p:grpSpPr>
+        <a:xfrm>
+          <a:off x="0" y="0"/>
+          <a:ext cx="0" cy="0"/>
+          <a:chOff x="0" y="0"/>
+          <a:chExt cx="0" cy="0"/>
+        </a:xfrm>
+      </p:grpSpPr>
+      <p:sp>
+        <p:nvSpPr>
+          <p:cNvPr id="40" name="PlaceHolder 1"/>
+          <p:cNvSpPr>
+            <a:spLocks noGrp="1"/>
+          </p:cNvSpPr>
+          <p:nvPr>
+            <p:ph type="title"/>
+          </p:nvPr>
+        </p:nvSpPr>
+        <p:spPr>
+          <a:xfrm>
+            <a:off x="457200" y="205200"/>
+            <a:ext cx="8229240" cy="858600"/>
+          </a:xfrm>
+          <a:prstGeom prst="rect">
+            <a:avLst/>
+          </a:prstGeom>
+        </p:spPr>
+        <p:txBody>
+          <a:bodyPr lIns="0" rIns="0" tIns="0" bIns="0" anchor="ctr"/>
+          <a:p>
+            <a:pPr algn="ctr"/>
+            <a:endParaRPr/>
+          </a:p>
+        </p:txBody>
+      </p:sp>
+      <p:sp>
+        <p:nvSpPr>
+          <p:cNvPr id="41" name="PlaceHolder 2"/>
+          <p:cNvSpPr>
+            <a:spLocks noGrp="1"/>
+          </p:cNvSpPr>
+          <p:nvPr>
+            <p:ph type="body"/>
+          </p:nvPr>
+        </p:nvSpPr>
+        <p:spPr>
+          <a:xfrm>
+            <a:off x="457200" y="1203480"/>
+            <a:ext cx="8229240" cy="2982960"/>
+          </a:xfrm>
+          <a:prstGeom prst="rect">
+            <a:avLst/>
+          </a:prstGeom>
+        </p:spPr>
+        <p:txBody>
+          <a:bodyPr lIns="0" rIns="0" tIns="0" bIns="0"/>
+          <a:p>
+            <a:endParaRPr/>
+          </a:p>
+        </p:txBody>
+      </p:sp>
+    </p:spTree>
+  </p:cSld>
+</p:sldLayout>
+</file>
+
+<file path=ppt/slideLayouts/slideLayout16.xml><?xml version="1.0" encoding="utf-8"?>
+<p:sldLayout xmlns:a="http://schemas.openxmlformats.org/drawingml/2006/main" xmlns:p="http://schemas.openxmlformats.org/presentationml/2006/main" xmlns:r="http://schemas.openxmlformats.org/officeDocument/2006/relationships" type="twoObj" preserve="1">
+  <p:cSld name="Title, 2 Content">
+    <p:spTree>
+      <p:nvGrpSpPr>
+        <p:cNvPr id="1" name=""/>
+        <p:cNvGrpSpPr/>
+        <p:nvPr/>
+      </p:nvGrpSpPr>
+      <p:grpSpPr>
+        <a:xfrm>
+          <a:off x="0" y="0"/>
+          <a:ext cx="0" cy="0"/>
+          <a:chOff x="0" y="0"/>
+          <a:chExt cx="0" cy="0"/>
+        </a:xfrm>
+      </p:grpSpPr>
+      <p:sp>
+        <p:nvSpPr>
+          <p:cNvPr id="42" name="PlaceHolder 1"/>
+          <p:cNvSpPr>
+            <a:spLocks noGrp="1"/>
+          </p:cNvSpPr>
+          <p:nvPr>
+            <p:ph type="title"/>
+          </p:nvPr>
+        </p:nvSpPr>
+        <p:spPr>
+          <a:xfrm>
+            <a:off x="457200" y="205200"/>
+            <a:ext cx="8229240" cy="858600"/>
+          </a:xfrm>
+          <a:prstGeom prst="rect">
+            <a:avLst/>
+          </a:prstGeom>
+        </p:spPr>
+        <p:txBody>
+          <a:bodyPr lIns="0" rIns="0" tIns="0" bIns="0" anchor="ctr"/>
+          <a:p>
+            <a:pPr algn="ctr"/>
+            <a:endParaRPr/>
+          </a:p>
+        </p:txBody>
+      </p:sp>
+      <p:sp>
+        <p:nvSpPr>
+          <p:cNvPr id="43" name="PlaceHolder 2"/>
+          <p:cNvSpPr>
+            <a:spLocks noGrp="1"/>
+          </p:cNvSpPr>
+          <p:nvPr>
+            <p:ph type="body"/>
+          </p:nvPr>
+        </p:nvSpPr>
+        <p:spPr>
+          <a:xfrm>
+            <a:off x="457200" y="1203480"/>
+            <a:ext cx="4015800" cy="2982960"/>
+          </a:xfrm>
+          <a:prstGeom prst="rect">
+            <a:avLst/>
+          </a:prstGeom>
+        </p:spPr>
+        <p:txBody>
+          <a:bodyPr lIns="0" rIns="0" tIns="0" bIns="0"/>
+          <a:p>
+            <a:endParaRPr/>
+          </a:p>
+        </p:txBody>
+      </p:sp>
+      <p:sp>
+        <p:nvSpPr>
+          <p:cNvPr id="44" name="PlaceHolder 3"/>
+          <p:cNvSpPr>
+            <a:spLocks noGrp="1"/>
+          </p:cNvSpPr>
+          <p:nvPr>
+            <p:ph type="body"/>
+          </p:nvPr>
+        </p:nvSpPr>
+        <p:spPr>
+          <a:xfrm>
+            <a:off x="4674240" y="1203480"/>
+            <a:ext cx="4015800" cy="2982960"/>
+          </a:xfrm>
+          <a:prstGeom prst="rect">
+            <a:avLst/>
+          </a:prstGeom>
+        </p:spPr>
+        <p:txBody>
+          <a:bodyPr lIns="0" rIns="0" tIns="0" bIns="0"/>
+          <a:p>
+            <a:endParaRPr/>
+          </a:p>
+        </p:txBody>
+      </p:sp>
+    </p:spTree>
+  </p:cSld>
+</p:sldLayout>
+</file>
+
+<file path=ppt/slideLayouts/slideLayout17.xml><?xml version="1.0" encoding="utf-8"?>
+<p:sldLayout xmlns:a="http://schemas.openxmlformats.org/drawingml/2006/main" xmlns:p="http://schemas.openxmlformats.org/presentationml/2006/main" xmlns:r="http://schemas.openxmlformats.org/officeDocument/2006/relationships" type="titleOnly" preserve="1">
+  <p:cSld name="Title Only">
+    <p:spTree>
+      <p:nvGrpSpPr>
+        <p:cNvPr id="1" name=""/>
+        <p:cNvGrpSpPr/>
+        <p:nvPr/>
+      </p:nvGrpSpPr>
+      <p:grpSpPr>
+        <a:xfrm>
+          <a:off x="0" y="0"/>
+          <a:ext cx="0" cy="0"/>
+          <a:chOff x="0" y="0"/>
+          <a:chExt cx="0" cy="0"/>
+        </a:xfrm>
+      </p:grpSpPr>
+      <p:sp>
+        <p:nvSpPr>
+          <p:cNvPr id="45" name="PlaceHolder 1"/>
+          <p:cNvSpPr>
+            <a:spLocks noGrp="1"/>
+          </p:cNvSpPr>
+          <p:nvPr>
+            <p:ph type="title"/>
+          </p:nvPr>
+        </p:nvSpPr>
+        <p:spPr>
+          <a:xfrm>
+            <a:off x="457200" y="205200"/>
+            <a:ext cx="8229240" cy="858600"/>
+          </a:xfrm>
+          <a:prstGeom prst="rect">
+            <a:avLst/>
+          </a:prstGeom>
+        </p:spPr>
+        <p:txBody>
+          <a:bodyPr lIns="0" rIns="0" tIns="0" bIns="0" anchor="ctr"/>
+          <a:p>
+            <a:pPr algn="ctr"/>
+            <a:endParaRPr/>
+          </a:p>
+        </p:txBody>
+      </p:sp>
+    </p:spTree>
+  </p:cSld>
+</p:sldLayout>
+</file>
+
+<file path=ppt/slideLayouts/slideLayout18.xml><?xml version="1.0" encoding="utf-8"?>
+<p:sldLayout xmlns:a="http://schemas.openxmlformats.org/drawingml/2006/main" xmlns:p="http://schemas.openxmlformats.org/presentationml/2006/main" xmlns:r="http://schemas.openxmlformats.org/officeDocument/2006/relationships" type="objOnly" preserve="1">
+  <p:cSld name="Centered Text">
+    <p:spTree>
+      <p:nvGrpSpPr>
+        <p:cNvPr id="1" name=""/>
+        <p:cNvGrpSpPr/>
+        <p:nvPr/>
+      </p:nvGrpSpPr>
+      <p:grpSpPr>
+        <a:xfrm>
+          <a:off x="0" y="0"/>
+          <a:ext cx="0" cy="0"/>
+          <a:chOff x="0" y="0"/>
+          <a:chExt cx="0" cy="0"/>
+        </a:xfrm>
+      </p:grpSpPr>
+      <p:sp>
+        <p:nvSpPr>
+          <p:cNvPr id="46" name="PlaceHolder 1"/>
+          <p:cNvSpPr>
+            <a:spLocks noGrp="1"/>
+          </p:cNvSpPr>
+          <p:nvPr>
+            <p:ph type="subTitle"/>
+          </p:nvPr>
+        </p:nvSpPr>
+        <p:spPr>
+          <a:xfrm>
+            <a:off x="457200" y="205200"/>
+            <a:ext cx="8229240" cy="3981240"/>
+          </a:xfrm>
+          <a:prstGeom prst="rect">
+            <a:avLst/>
+          </a:prstGeom>
+        </p:spPr>
+        <p:txBody>
+          <a:bodyPr lIns="0" rIns="0" tIns="0" bIns="0" anchor="ctr"/>
+          <a:p>
+            <a:pPr algn="ctr"/>
+            <a:endParaRPr/>
+          </a:p>
+        </p:txBody>
+      </p:sp>
+    </p:spTree>
+  </p:cSld>
+</p:sldLayout>
+</file>
+
+<file path=ppt/slideLayouts/slideLayout19.xml><?xml version="1.0" encoding="utf-8"?>
+<p:sldLayout xmlns:a="http://schemas.openxmlformats.org/drawingml/2006/main" xmlns:p="http://schemas.openxmlformats.org/presentationml/2006/main" xmlns:r="http://schemas.openxmlformats.org/officeDocument/2006/relationships" type="twoObjAndObj" preserve="1">
+  <p:cSld name="Title, 2 Content and Content">
+    <p:spTree>
+      <p:nvGrpSpPr>
+        <p:cNvPr id="1" name=""/>
+        <p:cNvGrpSpPr/>
+        <p:nvPr/>
+      </p:nvGrpSpPr>
+      <p:grpSpPr>
+        <a:xfrm>
+          <a:off x="0" y="0"/>
+          <a:ext cx="0" cy="0"/>
+          <a:chOff x="0" y="0"/>
+          <a:chExt cx="0" cy="0"/>
+        </a:xfrm>
+      </p:grpSpPr>
+      <p:sp>
+        <p:nvSpPr>
+          <p:cNvPr id="47" name="PlaceHolder 1"/>
+          <p:cNvSpPr>
+            <a:spLocks noGrp="1"/>
+          </p:cNvSpPr>
+          <p:nvPr>
+            <p:ph type="title"/>
+          </p:nvPr>
+        </p:nvSpPr>
+        <p:spPr>
+          <a:xfrm>
+            <a:off x="457200" y="205200"/>
+            <a:ext cx="8229240" cy="858600"/>
+          </a:xfrm>
+          <a:prstGeom prst="rect">
+            <a:avLst/>
+          </a:prstGeom>
+        </p:spPr>
+        <p:txBody>
+          <a:bodyPr lIns="0" rIns="0" tIns="0" bIns="0" anchor="ctr"/>
+          <a:p>
+            <a:pPr algn="ctr"/>
+            <a:endParaRPr/>
+          </a:p>
+        </p:txBody>
+      </p:sp>
+      <p:sp>
+        <p:nvSpPr>
+          <p:cNvPr id="48" name="PlaceHolder 2"/>
+          <p:cNvSpPr>
+            <a:spLocks noGrp="1"/>
+          </p:cNvSpPr>
+          <p:nvPr>
+            <p:ph type="body"/>
+          </p:nvPr>
+        </p:nvSpPr>
+        <p:spPr>
+          <a:xfrm>
+            <a:off x="457200" y="1203480"/>
+            <a:ext cx="4015800" cy="1422720"/>
+          </a:xfrm>
+          <a:prstGeom prst="rect">
+            <a:avLst/>
+          </a:prstGeom>
+        </p:spPr>
+        <p:txBody>
+          <a:bodyPr lIns="0" rIns="0" tIns="0" bIns="0"/>
+          <a:p>
+            <a:endParaRPr/>
+          </a:p>
+        </p:txBody>
+      </p:sp>
+      <p:sp>
+        <p:nvSpPr>
+          <p:cNvPr id="49" name="PlaceHolder 3"/>
+          <p:cNvSpPr>
+            <a:spLocks noGrp="1"/>
+          </p:cNvSpPr>
+          <p:nvPr>
+            <p:ph type="body"/>
+          </p:nvPr>
+        </p:nvSpPr>
+        <p:spPr>
+          <a:xfrm>
+            <a:off x="457200" y="2761920"/>
+            <a:ext cx="4015800" cy="1422720"/>
+          </a:xfrm>
+          <a:prstGeom prst="rect">
+            <a:avLst/>
+          </a:prstGeom>
+        </p:spPr>
+        <p:txBody>
+          <a:bodyPr lIns="0" rIns="0" tIns="0" bIns="0"/>
+          <a:p>
+            <a:endParaRPr/>
+          </a:p>
+        </p:txBody>
+      </p:sp>
+      <p:sp>
+        <p:nvSpPr>
+          <p:cNvPr id="50" name="PlaceHolder 4"/>
+          <p:cNvSpPr>
+            <a:spLocks noGrp="1"/>
+          </p:cNvSpPr>
+          <p:nvPr>
+            <p:ph type="body"/>
+          </p:nvPr>
+        </p:nvSpPr>
+        <p:spPr>
+          <a:xfrm>
+            <a:off x="4674240" y="1203480"/>
+            <a:ext cx="4015800" cy="2982960"/>
+          </a:xfrm>
+          <a:prstGeom prst="rect">
+            <a:avLst/>
+          </a:prstGeom>
+        </p:spPr>
+        <p:txBody>
+          <a:bodyPr lIns="0" rIns="0" tIns="0" bIns="0"/>
+          <a:p>
+            <a:endParaRPr/>
+          </a:p>
+        </p:txBody>
+      </p:sp>
+    </p:spTree>
+  </p:cSld>
+</p:sldLayout>
+</file>
+
 <file path=ppt/slideLayouts/slideLayout2.xml><?xml version="1.0" encoding="utf-8"?>
 <p:sldLayout xmlns:a="http://schemas.openxmlformats.org/drawingml/2006/main" xmlns:p="http://schemas.openxmlformats.org/presentationml/2006/main" xmlns:r="http://schemas.openxmlformats.org/officeDocument/2006/relationships" type="tx" preserve="1">
   <p:cSld name="Title Slide">
@@ -507,6 +1010,661 @@
           </a:p>
         </p:txBody>
       </p:sp>
+    </p:spTree>
+  </p:cSld>
+</p:sldLayout>
+</file>
+
+<file path=ppt/slideLayouts/slideLayout20.xml><?xml version="1.0" encoding="utf-8"?>
+<p:sldLayout xmlns:a="http://schemas.openxmlformats.org/drawingml/2006/main" xmlns:p="http://schemas.openxmlformats.org/presentationml/2006/main" xmlns:r="http://schemas.openxmlformats.org/officeDocument/2006/relationships" type="objAndTwoObj" preserve="1">
+  <p:cSld name="Title Content and 2 Content">
+    <p:spTree>
+      <p:nvGrpSpPr>
+        <p:cNvPr id="1" name=""/>
+        <p:cNvGrpSpPr/>
+        <p:nvPr/>
+      </p:nvGrpSpPr>
+      <p:grpSpPr>
+        <a:xfrm>
+          <a:off x="0" y="0"/>
+          <a:ext cx="0" cy="0"/>
+          <a:chOff x="0" y="0"/>
+          <a:chExt cx="0" cy="0"/>
+        </a:xfrm>
+      </p:grpSpPr>
+      <p:sp>
+        <p:nvSpPr>
+          <p:cNvPr id="51" name="PlaceHolder 1"/>
+          <p:cNvSpPr>
+            <a:spLocks noGrp="1"/>
+          </p:cNvSpPr>
+          <p:nvPr>
+            <p:ph type="title"/>
+          </p:nvPr>
+        </p:nvSpPr>
+        <p:spPr>
+          <a:xfrm>
+            <a:off x="457200" y="205200"/>
+            <a:ext cx="8229240" cy="858600"/>
+          </a:xfrm>
+          <a:prstGeom prst="rect">
+            <a:avLst/>
+          </a:prstGeom>
+        </p:spPr>
+        <p:txBody>
+          <a:bodyPr lIns="0" rIns="0" tIns="0" bIns="0" anchor="ctr"/>
+          <a:p>
+            <a:pPr algn="ctr"/>
+            <a:endParaRPr/>
+          </a:p>
+        </p:txBody>
+      </p:sp>
+      <p:sp>
+        <p:nvSpPr>
+          <p:cNvPr id="52" name="PlaceHolder 2"/>
+          <p:cNvSpPr>
+            <a:spLocks noGrp="1"/>
+          </p:cNvSpPr>
+          <p:nvPr>
+            <p:ph type="body"/>
+          </p:nvPr>
+        </p:nvSpPr>
+        <p:spPr>
+          <a:xfrm>
+            <a:off x="457200" y="1203480"/>
+            <a:ext cx="4015800" cy="2982960"/>
+          </a:xfrm>
+          <a:prstGeom prst="rect">
+            <a:avLst/>
+          </a:prstGeom>
+        </p:spPr>
+        <p:txBody>
+          <a:bodyPr lIns="0" rIns="0" tIns="0" bIns="0"/>
+          <a:p>
+            <a:endParaRPr/>
+          </a:p>
+        </p:txBody>
+      </p:sp>
+      <p:sp>
+        <p:nvSpPr>
+          <p:cNvPr id="53" name="PlaceHolder 3"/>
+          <p:cNvSpPr>
+            <a:spLocks noGrp="1"/>
+          </p:cNvSpPr>
+          <p:nvPr>
+            <p:ph type="body"/>
+          </p:nvPr>
+        </p:nvSpPr>
+        <p:spPr>
+          <a:xfrm>
+            <a:off x="4674240" y="1203480"/>
+            <a:ext cx="4015800" cy="1422720"/>
+          </a:xfrm>
+          <a:prstGeom prst="rect">
+            <a:avLst/>
+          </a:prstGeom>
+        </p:spPr>
+        <p:txBody>
+          <a:bodyPr lIns="0" rIns="0" tIns="0" bIns="0"/>
+          <a:p>
+            <a:endParaRPr/>
+          </a:p>
+        </p:txBody>
+      </p:sp>
+      <p:sp>
+        <p:nvSpPr>
+          <p:cNvPr id="54" name="PlaceHolder 4"/>
+          <p:cNvSpPr>
+            <a:spLocks noGrp="1"/>
+          </p:cNvSpPr>
+          <p:nvPr>
+            <p:ph type="body"/>
+          </p:nvPr>
+        </p:nvSpPr>
+        <p:spPr>
+          <a:xfrm>
+            <a:off x="4674240" y="2761920"/>
+            <a:ext cx="4015800" cy="1422720"/>
+          </a:xfrm>
+          <a:prstGeom prst="rect">
+            <a:avLst/>
+          </a:prstGeom>
+        </p:spPr>
+        <p:txBody>
+          <a:bodyPr lIns="0" rIns="0" tIns="0" bIns="0"/>
+          <a:p>
+            <a:endParaRPr/>
+          </a:p>
+        </p:txBody>
+      </p:sp>
+    </p:spTree>
+  </p:cSld>
+</p:sldLayout>
+</file>
+
+<file path=ppt/slideLayouts/slideLayout21.xml><?xml version="1.0" encoding="utf-8"?>
+<p:sldLayout xmlns:a="http://schemas.openxmlformats.org/drawingml/2006/main" xmlns:p="http://schemas.openxmlformats.org/presentationml/2006/main" xmlns:r="http://schemas.openxmlformats.org/officeDocument/2006/relationships" type="twoObjOverTx" preserve="1">
+  <p:cSld name="Title, 2 Content over Content">
+    <p:spTree>
+      <p:nvGrpSpPr>
+        <p:cNvPr id="1" name=""/>
+        <p:cNvGrpSpPr/>
+        <p:nvPr/>
+      </p:nvGrpSpPr>
+      <p:grpSpPr>
+        <a:xfrm>
+          <a:off x="0" y="0"/>
+          <a:ext cx="0" cy="0"/>
+          <a:chOff x="0" y="0"/>
+          <a:chExt cx="0" cy="0"/>
+        </a:xfrm>
+      </p:grpSpPr>
+      <p:sp>
+        <p:nvSpPr>
+          <p:cNvPr id="55" name="PlaceHolder 1"/>
+          <p:cNvSpPr>
+            <a:spLocks noGrp="1"/>
+          </p:cNvSpPr>
+          <p:nvPr>
+            <p:ph type="title"/>
+          </p:nvPr>
+        </p:nvSpPr>
+        <p:spPr>
+          <a:xfrm>
+            <a:off x="457200" y="205200"/>
+            <a:ext cx="8229240" cy="858600"/>
+          </a:xfrm>
+          <a:prstGeom prst="rect">
+            <a:avLst/>
+          </a:prstGeom>
+        </p:spPr>
+        <p:txBody>
+          <a:bodyPr lIns="0" rIns="0" tIns="0" bIns="0" anchor="ctr"/>
+          <a:p>
+            <a:pPr algn="ctr"/>
+            <a:endParaRPr/>
+          </a:p>
+        </p:txBody>
+      </p:sp>
+      <p:sp>
+        <p:nvSpPr>
+          <p:cNvPr id="56" name="PlaceHolder 2"/>
+          <p:cNvSpPr>
+            <a:spLocks noGrp="1"/>
+          </p:cNvSpPr>
+          <p:nvPr>
+            <p:ph type="body"/>
+          </p:nvPr>
+        </p:nvSpPr>
+        <p:spPr>
+          <a:xfrm>
+            <a:off x="457200" y="1203480"/>
+            <a:ext cx="4015800" cy="1422720"/>
+          </a:xfrm>
+          <a:prstGeom prst="rect">
+            <a:avLst/>
+          </a:prstGeom>
+        </p:spPr>
+        <p:txBody>
+          <a:bodyPr lIns="0" rIns="0" tIns="0" bIns="0"/>
+          <a:p>
+            <a:endParaRPr/>
+          </a:p>
+        </p:txBody>
+      </p:sp>
+      <p:sp>
+        <p:nvSpPr>
+          <p:cNvPr id="57" name="PlaceHolder 3"/>
+          <p:cNvSpPr>
+            <a:spLocks noGrp="1"/>
+          </p:cNvSpPr>
+          <p:nvPr>
+            <p:ph type="body"/>
+          </p:nvPr>
+        </p:nvSpPr>
+        <p:spPr>
+          <a:xfrm>
+            <a:off x="4674240" y="1203480"/>
+            <a:ext cx="4015800" cy="1422720"/>
+          </a:xfrm>
+          <a:prstGeom prst="rect">
+            <a:avLst/>
+          </a:prstGeom>
+        </p:spPr>
+        <p:txBody>
+          <a:bodyPr lIns="0" rIns="0" tIns="0" bIns="0"/>
+          <a:p>
+            <a:endParaRPr/>
+          </a:p>
+        </p:txBody>
+      </p:sp>
+      <p:sp>
+        <p:nvSpPr>
+          <p:cNvPr id="58" name="PlaceHolder 4"/>
+          <p:cNvSpPr>
+            <a:spLocks noGrp="1"/>
+          </p:cNvSpPr>
+          <p:nvPr>
+            <p:ph type="body"/>
+          </p:nvPr>
+        </p:nvSpPr>
+        <p:spPr>
+          <a:xfrm>
+            <a:off x="457200" y="2761920"/>
+            <a:ext cx="8229240" cy="1422720"/>
+          </a:xfrm>
+          <a:prstGeom prst="rect">
+            <a:avLst/>
+          </a:prstGeom>
+        </p:spPr>
+        <p:txBody>
+          <a:bodyPr lIns="0" rIns="0" tIns="0" bIns="0"/>
+          <a:p>
+            <a:endParaRPr/>
+          </a:p>
+        </p:txBody>
+      </p:sp>
+    </p:spTree>
+  </p:cSld>
+</p:sldLayout>
+</file>
+
+<file path=ppt/slideLayouts/slideLayout22.xml><?xml version="1.0" encoding="utf-8"?>
+<p:sldLayout xmlns:a="http://schemas.openxmlformats.org/drawingml/2006/main" xmlns:p="http://schemas.openxmlformats.org/presentationml/2006/main" xmlns:r="http://schemas.openxmlformats.org/officeDocument/2006/relationships" type="objOverTx" preserve="1">
+  <p:cSld name="Title, Content over Content">
+    <p:spTree>
+      <p:nvGrpSpPr>
+        <p:cNvPr id="1" name=""/>
+        <p:cNvGrpSpPr/>
+        <p:nvPr/>
+      </p:nvGrpSpPr>
+      <p:grpSpPr>
+        <a:xfrm>
+          <a:off x="0" y="0"/>
+          <a:ext cx="0" cy="0"/>
+          <a:chOff x="0" y="0"/>
+          <a:chExt cx="0" cy="0"/>
+        </a:xfrm>
+      </p:grpSpPr>
+      <p:sp>
+        <p:nvSpPr>
+          <p:cNvPr id="59" name="PlaceHolder 1"/>
+          <p:cNvSpPr>
+            <a:spLocks noGrp="1"/>
+          </p:cNvSpPr>
+          <p:nvPr>
+            <p:ph type="title"/>
+          </p:nvPr>
+        </p:nvSpPr>
+        <p:spPr>
+          <a:xfrm>
+            <a:off x="457200" y="205200"/>
+            <a:ext cx="8229240" cy="858600"/>
+          </a:xfrm>
+          <a:prstGeom prst="rect">
+            <a:avLst/>
+          </a:prstGeom>
+        </p:spPr>
+        <p:txBody>
+          <a:bodyPr lIns="0" rIns="0" tIns="0" bIns="0" anchor="ctr"/>
+          <a:p>
+            <a:pPr algn="ctr"/>
+            <a:endParaRPr/>
+          </a:p>
+        </p:txBody>
+      </p:sp>
+      <p:sp>
+        <p:nvSpPr>
+          <p:cNvPr id="60" name="PlaceHolder 2"/>
+          <p:cNvSpPr>
+            <a:spLocks noGrp="1"/>
+          </p:cNvSpPr>
+          <p:nvPr>
+            <p:ph type="body"/>
+          </p:nvPr>
+        </p:nvSpPr>
+        <p:spPr>
+          <a:xfrm>
+            <a:off x="457200" y="1203480"/>
+            <a:ext cx="8229240" cy="1422720"/>
+          </a:xfrm>
+          <a:prstGeom prst="rect">
+            <a:avLst/>
+          </a:prstGeom>
+        </p:spPr>
+        <p:txBody>
+          <a:bodyPr lIns="0" rIns="0" tIns="0" bIns="0"/>
+          <a:p>
+            <a:endParaRPr/>
+          </a:p>
+        </p:txBody>
+      </p:sp>
+      <p:sp>
+        <p:nvSpPr>
+          <p:cNvPr id="61" name="PlaceHolder 3"/>
+          <p:cNvSpPr>
+            <a:spLocks noGrp="1"/>
+          </p:cNvSpPr>
+          <p:nvPr>
+            <p:ph type="body"/>
+          </p:nvPr>
+        </p:nvSpPr>
+        <p:spPr>
+          <a:xfrm>
+            <a:off x="457200" y="2761920"/>
+            <a:ext cx="8229240" cy="1422720"/>
+          </a:xfrm>
+          <a:prstGeom prst="rect">
+            <a:avLst/>
+          </a:prstGeom>
+        </p:spPr>
+        <p:txBody>
+          <a:bodyPr lIns="0" rIns="0" tIns="0" bIns="0"/>
+          <a:p>
+            <a:endParaRPr/>
+          </a:p>
+        </p:txBody>
+      </p:sp>
+    </p:spTree>
+  </p:cSld>
+</p:sldLayout>
+</file>
+
+<file path=ppt/slideLayouts/slideLayout23.xml><?xml version="1.0" encoding="utf-8"?>
+<p:sldLayout xmlns:a="http://schemas.openxmlformats.org/drawingml/2006/main" xmlns:p="http://schemas.openxmlformats.org/presentationml/2006/main" xmlns:r="http://schemas.openxmlformats.org/officeDocument/2006/relationships" type="fourObj" preserve="1">
+  <p:cSld name="Title, 4 Content">
+    <p:spTree>
+      <p:nvGrpSpPr>
+        <p:cNvPr id="1" name=""/>
+        <p:cNvGrpSpPr/>
+        <p:nvPr/>
+      </p:nvGrpSpPr>
+      <p:grpSpPr>
+        <a:xfrm>
+          <a:off x="0" y="0"/>
+          <a:ext cx="0" cy="0"/>
+          <a:chOff x="0" y="0"/>
+          <a:chExt cx="0" cy="0"/>
+        </a:xfrm>
+      </p:grpSpPr>
+      <p:sp>
+        <p:nvSpPr>
+          <p:cNvPr id="62" name="PlaceHolder 1"/>
+          <p:cNvSpPr>
+            <a:spLocks noGrp="1"/>
+          </p:cNvSpPr>
+          <p:nvPr>
+            <p:ph type="title"/>
+          </p:nvPr>
+        </p:nvSpPr>
+        <p:spPr>
+          <a:xfrm>
+            <a:off x="457200" y="205200"/>
+            <a:ext cx="8229240" cy="858600"/>
+          </a:xfrm>
+          <a:prstGeom prst="rect">
+            <a:avLst/>
+          </a:prstGeom>
+        </p:spPr>
+        <p:txBody>
+          <a:bodyPr lIns="0" rIns="0" tIns="0" bIns="0" anchor="ctr"/>
+          <a:p>
+            <a:pPr algn="ctr"/>
+            <a:endParaRPr/>
+          </a:p>
+        </p:txBody>
+      </p:sp>
+      <p:sp>
+        <p:nvSpPr>
+          <p:cNvPr id="63" name="PlaceHolder 2"/>
+          <p:cNvSpPr>
+            <a:spLocks noGrp="1"/>
+          </p:cNvSpPr>
+          <p:nvPr>
+            <p:ph type="body"/>
+          </p:nvPr>
+        </p:nvSpPr>
+        <p:spPr>
+          <a:xfrm>
+            <a:off x="457200" y="1203480"/>
+            <a:ext cx="4015800" cy="1422720"/>
+          </a:xfrm>
+          <a:prstGeom prst="rect">
+            <a:avLst/>
+          </a:prstGeom>
+        </p:spPr>
+        <p:txBody>
+          <a:bodyPr lIns="0" rIns="0" tIns="0" bIns="0"/>
+          <a:p>
+            <a:endParaRPr/>
+          </a:p>
+        </p:txBody>
+      </p:sp>
+      <p:sp>
+        <p:nvSpPr>
+          <p:cNvPr id="64" name="PlaceHolder 3"/>
+          <p:cNvSpPr>
+            <a:spLocks noGrp="1"/>
+          </p:cNvSpPr>
+          <p:nvPr>
+            <p:ph type="body"/>
+          </p:nvPr>
+        </p:nvSpPr>
+        <p:spPr>
+          <a:xfrm>
+            <a:off x="4674240" y="1203480"/>
+            <a:ext cx="4015800" cy="1422720"/>
+          </a:xfrm>
+          <a:prstGeom prst="rect">
+            <a:avLst/>
+          </a:prstGeom>
+        </p:spPr>
+        <p:txBody>
+          <a:bodyPr lIns="0" rIns="0" tIns="0" bIns="0"/>
+          <a:p>
+            <a:endParaRPr/>
+          </a:p>
+        </p:txBody>
+      </p:sp>
+      <p:sp>
+        <p:nvSpPr>
+          <p:cNvPr id="65" name="PlaceHolder 4"/>
+          <p:cNvSpPr>
+            <a:spLocks noGrp="1"/>
+          </p:cNvSpPr>
+          <p:nvPr>
+            <p:ph type="body"/>
+          </p:nvPr>
+        </p:nvSpPr>
+        <p:spPr>
+          <a:xfrm>
+            <a:off x="4674240" y="2761920"/>
+            <a:ext cx="4015800" cy="1422720"/>
+          </a:xfrm>
+          <a:prstGeom prst="rect">
+            <a:avLst/>
+          </a:prstGeom>
+        </p:spPr>
+        <p:txBody>
+          <a:bodyPr lIns="0" rIns="0" tIns="0" bIns="0"/>
+          <a:p>
+            <a:endParaRPr/>
+          </a:p>
+        </p:txBody>
+      </p:sp>
+      <p:sp>
+        <p:nvSpPr>
+          <p:cNvPr id="66" name="PlaceHolder 5"/>
+          <p:cNvSpPr>
+            <a:spLocks noGrp="1"/>
+          </p:cNvSpPr>
+          <p:nvPr>
+            <p:ph type="body"/>
+          </p:nvPr>
+        </p:nvSpPr>
+        <p:spPr>
+          <a:xfrm>
+            <a:off x="457200" y="2761920"/>
+            <a:ext cx="4015800" cy="1422720"/>
+          </a:xfrm>
+          <a:prstGeom prst="rect">
+            <a:avLst/>
+          </a:prstGeom>
+        </p:spPr>
+        <p:txBody>
+          <a:bodyPr lIns="0" rIns="0" tIns="0" bIns="0"/>
+          <a:p>
+            <a:endParaRPr/>
+          </a:p>
+        </p:txBody>
+      </p:sp>
+    </p:spTree>
+  </p:cSld>
+</p:sldLayout>
+</file>
+
+<file path=ppt/slideLayouts/slideLayout24.xml><?xml version="1.0" encoding="utf-8"?>
+<p:sldLayout xmlns:a="http://schemas.openxmlformats.org/drawingml/2006/main" xmlns:p="http://schemas.openxmlformats.org/presentationml/2006/main" xmlns:r="http://schemas.openxmlformats.org/officeDocument/2006/relationships" type="blank" preserve="1">
+  <p:cSld name="Title, 6 Content">
+    <p:spTree>
+      <p:nvGrpSpPr>
+        <p:cNvPr id="1" name=""/>
+        <p:cNvGrpSpPr/>
+        <p:nvPr/>
+      </p:nvGrpSpPr>
+      <p:grpSpPr>
+        <a:xfrm>
+          <a:off x="0" y="0"/>
+          <a:ext cx="0" cy="0"/>
+          <a:chOff x="0" y="0"/>
+          <a:chExt cx="0" cy="0"/>
+        </a:xfrm>
+      </p:grpSpPr>
+      <p:sp>
+        <p:nvSpPr>
+          <p:cNvPr id="67" name="PlaceHolder 1"/>
+          <p:cNvSpPr>
+            <a:spLocks noGrp="1"/>
+          </p:cNvSpPr>
+          <p:nvPr>
+            <p:ph type="title"/>
+          </p:nvPr>
+        </p:nvSpPr>
+        <p:spPr>
+          <a:xfrm>
+            <a:off x="457200" y="205200"/>
+            <a:ext cx="8229240" cy="858600"/>
+          </a:xfrm>
+          <a:prstGeom prst="rect">
+            <a:avLst/>
+          </a:prstGeom>
+        </p:spPr>
+        <p:txBody>
+          <a:bodyPr lIns="0" rIns="0" tIns="0" bIns="0" anchor="ctr"/>
+          <a:p>
+            <a:pPr algn="ctr"/>
+            <a:endParaRPr/>
+          </a:p>
+        </p:txBody>
+      </p:sp>
+      <p:sp>
+        <p:nvSpPr>
+          <p:cNvPr id="68" name="PlaceHolder 2"/>
+          <p:cNvSpPr>
+            <a:spLocks noGrp="1"/>
+          </p:cNvSpPr>
+          <p:nvPr>
+            <p:ph type="body"/>
+          </p:nvPr>
+        </p:nvSpPr>
+        <p:spPr>
+          <a:xfrm>
+            <a:off x="457200" y="1203480"/>
+            <a:ext cx="8229240" cy="2982960"/>
+          </a:xfrm>
+          <a:prstGeom prst="rect">
+            <a:avLst/>
+          </a:prstGeom>
+        </p:spPr>
+        <p:txBody>
+          <a:bodyPr lIns="0" rIns="0" tIns="0" bIns="0"/>
+          <a:p>
+            <a:endParaRPr/>
+          </a:p>
+        </p:txBody>
+      </p:sp>
+      <p:sp>
+        <p:nvSpPr>
+          <p:cNvPr id="69" name="PlaceHolder 3"/>
+          <p:cNvSpPr>
+            <a:spLocks noGrp="1"/>
+          </p:cNvSpPr>
+          <p:nvPr>
+            <p:ph type="body"/>
+          </p:nvPr>
+        </p:nvSpPr>
+        <p:spPr>
+          <a:xfrm>
+            <a:off x="457200" y="1203480"/>
+            <a:ext cx="8229240" cy="2982960"/>
+          </a:xfrm>
+          <a:prstGeom prst="rect">
+            <a:avLst/>
+          </a:prstGeom>
+        </p:spPr>
+        <p:txBody>
+          <a:bodyPr lIns="0" rIns="0" tIns="0" bIns="0"/>
+          <a:p>
+            <a:endParaRPr/>
+          </a:p>
+        </p:txBody>
+      </p:sp>
+      <p:pic>
+        <p:nvPicPr>
+          <p:cNvPr id="70" name="" descr=""/>
+          <p:cNvPicPr/>
+          <p:nvPr/>
+        </p:nvPicPr>
+        <p:blipFill>
+          <a:blip r:embed="rId2"/>
+          <a:stretch/>
+        </p:blipFill>
+        <p:spPr>
+          <a:xfrm>
+            <a:off x="2702160" y="1203480"/>
+            <a:ext cx="3738600" cy="2982960"/>
+          </a:xfrm>
+          <a:prstGeom prst="rect">
+            <a:avLst/>
+          </a:prstGeom>
+          <a:ln>
+            <a:noFill/>
+          </a:ln>
+        </p:spPr>
+      </p:pic>
+      <p:pic>
+        <p:nvPicPr>
+          <p:cNvPr id="71" name="" descr=""/>
+          <p:cNvPicPr/>
+          <p:nvPr/>
+        </p:nvPicPr>
+        <p:blipFill>
+          <a:blip r:embed="rId3"/>
+          <a:stretch/>
+        </p:blipFill>
+        <p:spPr>
+          <a:xfrm>
+            <a:off x="2702160" y="1203480"/>
+            <a:ext cx="3738600" cy="2982960"/>
+          </a:xfrm>
+          <a:prstGeom prst="rect">
+            <a:avLst/>
+          </a:prstGeom>
+          <a:ln>
+            <a:noFill/>
+          </a:ln>
+        </p:spPr>
+      </p:pic>
     </p:spTree>
   </p:cSld>
 </p:sldLayout>
@@ -1386,6 +2544,225 @@
 </p:sldMaster>
 </file>
 
+<file path=ppt/slideMasters/slideMaster2.xml><?xml version="1.0" encoding="utf-8"?>
+<p:sldMaster xmlns:a="http://schemas.openxmlformats.org/drawingml/2006/main" xmlns:p="http://schemas.openxmlformats.org/presentationml/2006/main" xmlns:r="http://schemas.openxmlformats.org/officeDocument/2006/relationships">
+  <p:cSld>
+    <p:bg>
+      <p:bgPr>
+        <a:solidFill>
+          <a:srgbClr val="ffffff"/>
+        </a:solidFill>
+      </p:bgPr>
+    </p:bg>
+    <p:spTree>
+      <p:nvGrpSpPr>
+        <p:cNvPr id="1" name=""/>
+        <p:cNvGrpSpPr/>
+        <p:nvPr/>
+      </p:nvGrpSpPr>
+      <p:grpSpPr>
+        <a:xfrm>
+          <a:off x="0" y="0"/>
+          <a:ext cx="0" cy="0"/>
+          <a:chOff x="0" y="0"/>
+          <a:chExt cx="0" cy="0"/>
+        </a:xfrm>
+      </p:grpSpPr>
+      <p:sp>
+        <p:nvSpPr>
+          <p:cNvPr id="36" name="PlaceHolder 1"/>
+          <p:cNvSpPr>
+            <a:spLocks noGrp="1"/>
+          </p:cNvSpPr>
+          <p:nvPr>
+            <p:ph type="title"/>
+          </p:nvPr>
+        </p:nvSpPr>
+        <p:spPr>
+          <a:xfrm>
+            <a:off x="457200" y="205200"/>
+            <a:ext cx="8229240" cy="858600"/>
+          </a:xfrm>
+          <a:prstGeom prst="rect">
+            <a:avLst/>
+          </a:prstGeom>
+        </p:spPr>
+        <p:txBody>
+          <a:bodyPr lIns="0" rIns="0" tIns="0" bIns="0" anchor="ctr"/>
+          <a:p>
+            <a:pPr algn="ctr"/>
+            <a:r>
+              <a:rPr lang="en-AU" sz="4400" spc="-1">
+                <a:latin typeface="Arial"/>
+              </a:rPr>
+              <a:t>Click to edit the title text format</a:t>
+            </a:r>
+            <a:endParaRPr/>
+          </a:p>
+        </p:txBody>
+      </p:sp>
+      <p:sp>
+        <p:nvSpPr>
+          <p:cNvPr id="37" name="PlaceHolder 2"/>
+          <p:cNvSpPr>
+            <a:spLocks noGrp="1"/>
+          </p:cNvSpPr>
+          <p:nvPr>
+            <p:ph type="body"/>
+          </p:nvPr>
+        </p:nvSpPr>
+        <p:spPr>
+          <a:xfrm>
+            <a:off x="457200" y="1203480"/>
+            <a:ext cx="8229240" cy="2982960"/>
+          </a:xfrm>
+          <a:prstGeom prst="rect">
+            <a:avLst/>
+          </a:prstGeom>
+        </p:spPr>
+        <p:txBody>
+          <a:bodyPr lIns="0" rIns="0" tIns="0" bIns="0"/>
+          <a:p>
+            <a:pPr marL="432000" indent="-324000">
+              <a:buClr>
+                <a:srgbClr val="ffffff"/>
+              </a:buClr>
+              <a:buSzPct val="45000"/>
+              <a:buFont typeface="StarSymbol"/>
+              <a:buChar char=""/>
+            </a:pPr>
+            <a:r>
+              <a:rPr lang="en-AU" sz="3200" spc="-1">
+                <a:latin typeface="Arial"/>
+              </a:rPr>
+              <a:t>Click to edit the outline text format</a:t>
+            </a:r>
+            <a:endParaRPr/>
+          </a:p>
+          <a:p>
+            <a:pPr lvl="1" marL="864000" indent="-324000">
+              <a:buClr>
+                <a:srgbClr val="ffffff"/>
+              </a:buClr>
+              <a:buSzPct val="75000"/>
+              <a:buFont typeface="StarSymbol"/>
+              <a:buChar char=""/>
+            </a:pPr>
+            <a:r>
+              <a:rPr lang="en-AU" sz="2800" spc="-1">
+                <a:latin typeface="Arial"/>
+              </a:rPr>
+              <a:t>Second Outline Level</a:t>
+            </a:r>
+            <a:endParaRPr/>
+          </a:p>
+          <a:p>
+            <a:pPr lvl="2" marL="1296000" indent="-288000">
+              <a:buClr>
+                <a:srgbClr val="ffffff"/>
+              </a:buClr>
+              <a:buSzPct val="45000"/>
+              <a:buFont typeface="StarSymbol"/>
+              <a:buChar char=""/>
+            </a:pPr>
+            <a:r>
+              <a:rPr lang="en-AU" sz="2400" spc="-1">
+                <a:latin typeface="Arial"/>
+              </a:rPr>
+              <a:t>Third Outline Level</a:t>
+            </a:r>
+            <a:endParaRPr/>
+          </a:p>
+          <a:p>
+            <a:pPr lvl="3" marL="1728000" indent="-216000">
+              <a:buClr>
+                <a:srgbClr val="ffffff"/>
+              </a:buClr>
+              <a:buSzPct val="75000"/>
+              <a:buFont typeface="StarSymbol"/>
+              <a:buChar char=""/>
+            </a:pPr>
+            <a:r>
+              <a:rPr lang="en-AU" sz="2000" spc="-1">
+                <a:latin typeface="Arial"/>
+              </a:rPr>
+              <a:t>Fourth Outline Level</a:t>
+            </a:r>
+            <a:endParaRPr/>
+          </a:p>
+          <a:p>
+            <a:pPr lvl="4" marL="2160000" indent="-216000">
+              <a:buClr>
+                <a:srgbClr val="ffffff"/>
+              </a:buClr>
+              <a:buSzPct val="45000"/>
+              <a:buFont typeface="StarSymbol"/>
+              <a:buChar char=""/>
+            </a:pPr>
+            <a:r>
+              <a:rPr lang="en-AU" sz="2000" spc="-1">
+                <a:latin typeface="Arial"/>
+              </a:rPr>
+              <a:t>Fifth Outline Level</a:t>
+            </a:r>
+            <a:endParaRPr/>
+          </a:p>
+          <a:p>
+            <a:pPr lvl="5" marL="2592000" indent="-216000">
+              <a:buClr>
+                <a:srgbClr val="ffffff"/>
+              </a:buClr>
+              <a:buSzPct val="45000"/>
+              <a:buFont typeface="StarSymbol"/>
+              <a:buChar char=""/>
+            </a:pPr>
+            <a:r>
+              <a:rPr lang="en-AU" sz="2000" spc="-1">
+                <a:latin typeface="Arial"/>
+              </a:rPr>
+              <a:t>Sixth Outline Level</a:t>
+            </a:r>
+            <a:endParaRPr/>
+          </a:p>
+          <a:p>
+            <a:pPr lvl="6" marL="3024000" indent="-216000">
+              <a:buClr>
+                <a:srgbClr val="ffffff"/>
+              </a:buClr>
+              <a:buSzPct val="45000"/>
+              <a:buFont typeface="StarSymbol"/>
+              <a:buChar char=""/>
+            </a:pPr>
+            <a:r>
+              <a:rPr lang="en-AU" sz="2000" spc="-1">
+                <a:latin typeface="Arial"/>
+              </a:rPr>
+              <a:t>Seventh Outline Level</a:t>
+            </a:r>
+            <a:endParaRPr/>
+          </a:p>
+        </p:txBody>
+      </p:sp>
+    </p:spTree>
+  </p:cSld>
+  <p:clrMap bg1="lt1" bg2="lt2" tx1="dk1" tx2="dk2" accent1="accent1" accent2="accent2" accent3="accent3" accent4="accent4" accent5="accent5" accent6="accent6" hlink="hlink" folHlink="folHlink"/>
+  <p:sldLayoutIdLst>
+    <p:sldLayoutId id="2147483662" r:id="rId2"/>
+    <p:sldLayoutId id="2147483663" r:id="rId3"/>
+    <p:sldLayoutId id="2147483664" r:id="rId4"/>
+    <p:sldLayoutId id="2147483665" r:id="rId5"/>
+    <p:sldLayoutId id="2147483666" r:id="rId6"/>
+    <p:sldLayoutId id="2147483667" r:id="rId7"/>
+    <p:sldLayoutId id="2147483668" r:id="rId8"/>
+    <p:sldLayoutId id="2147483669" r:id="rId9"/>
+    <p:sldLayoutId id="2147483670" r:id="rId10"/>
+    <p:sldLayoutId id="2147483671" r:id="rId11"/>
+    <p:sldLayoutId id="2147483672" r:id="rId12"/>
+    <p:sldLayoutId id="2147483673" r:id="rId13"/>
+  </p:sldLayoutIdLst>
+</p:sldMaster>
+</file>
+
 <file path=ppt/slides/slide1.xml><?xml version="1.0" encoding="utf-8"?>
 <p:sld xmlns:a="http://schemas.openxmlformats.org/drawingml/2006/main" xmlns:p="http://schemas.openxmlformats.org/presentationml/2006/main" xmlns:r="http://schemas.openxmlformats.org/officeDocument/2006/relationships">
   <p:cSld>
@@ -1405,14 +2782,14 @@
       </p:grpSpPr>
       <p:sp>
         <p:nvSpPr>
-          <p:cNvPr id="36" name="CustomShape 1"/>
+          <p:cNvPr id="72" name="CustomShape 1"/>
           <p:cNvSpPr/>
           <p:nvPr/>
         </p:nvSpPr>
         <p:spPr>
           <a:xfrm>
             <a:off x="457200" y="205920"/>
-            <a:ext cx="8228520" cy="856440"/>
+            <a:ext cx="8227800" cy="855720"/>
           </a:xfrm>
           <a:prstGeom prst="rect">
             <a:avLst/>
@@ -1457,14 +2834,14 @@
       </p:sp>
       <p:sp>
         <p:nvSpPr>
-          <p:cNvPr id="37" name="CustomShape 2"/>
+          <p:cNvPr id="73" name="CustomShape 2"/>
           <p:cNvSpPr/>
           <p:nvPr/>
         </p:nvSpPr>
         <p:spPr>
           <a:xfrm>
             <a:off x="457200" y="1200240"/>
-            <a:ext cx="8228520" cy="3724560"/>
+            <a:ext cx="8227800" cy="3723840"/>
           </a:xfrm>
           <a:prstGeom prst="rect">
             <a:avLst/>
@@ -1601,14 +2978,14 @@
       </p:sp>
       <p:sp>
         <p:nvSpPr>
-          <p:cNvPr id="38" name="CustomShape 3"/>
+          <p:cNvPr id="74" name="CustomShape 3"/>
           <p:cNvSpPr/>
           <p:nvPr/>
         </p:nvSpPr>
         <p:spPr>
           <a:xfrm>
             <a:off x="0" y="0"/>
-            <a:ext cx="2998800" cy="2998800"/>
+            <a:ext cx="2998080" cy="2998080"/>
           </a:xfrm>
           <a:prstGeom prst="rect">
             <a:avLst/>
@@ -1702,14 +3079,242 @@
       </p:grpSpPr>
       <p:sp>
         <p:nvSpPr>
-          <p:cNvPr id="39" name="CustomShape 1"/>
+          <p:cNvPr id="75" name="CustomShape 1"/>
           <p:cNvSpPr/>
           <p:nvPr/>
         </p:nvSpPr>
         <p:spPr>
           <a:xfrm>
             <a:off x="457200" y="205920"/>
-            <a:ext cx="8228520" cy="856440"/>
+            <a:ext cx="8227800" cy="855720"/>
+          </a:xfrm>
+          <a:prstGeom prst="rect">
+            <a:avLst/>
+          </a:prstGeom>
+          <a:noFill/>
+          <a:ln>
+            <a:noFill/>
+          </a:ln>
+        </p:spPr>
+        <p:style>
+          <a:lnRef idx="0"/>
+          <a:fillRef idx="0"/>
+          <a:effectRef idx="0"/>
+          <a:fontRef idx="minor"/>
+        </p:style>
+        <p:txBody>
+          <a:bodyPr lIns="90000" rIns="90000" tIns="91440" bIns="91440" anchor="b"/>
+          <a:p>
+            <a:pPr>
+              <a:lnSpc>
+                <a:spcPct val="100000"/>
+              </a:lnSpc>
+            </a:pPr>
+            <a:r>
+              <a:rPr b="1" lang="en-AU" sz="3600" spc="-1" strike="noStrike">
+                <a:solidFill>
+                  <a:srgbClr val="000000"/>
+                </a:solidFill>
+                <a:uFill>
+                  <a:solidFill>
+                    <a:srgbClr val="ffffff"/>
+                  </a:solidFill>
+                </a:uFill>
+                <a:latin typeface="Arial"/>
+                <a:ea typeface="Arial"/>
+              </a:rPr>
+              <a:t>Key Pairs</a:t>
+            </a:r>
+            <a:endParaRPr/>
+          </a:p>
+        </p:txBody>
+      </p:sp>
+      <p:sp>
+        <p:nvSpPr>
+          <p:cNvPr id="76" name="CustomShape 2"/>
+          <p:cNvSpPr/>
+          <p:nvPr/>
+        </p:nvSpPr>
+        <p:spPr>
+          <a:xfrm>
+            <a:off x="457200" y="1200240"/>
+            <a:ext cx="8227800" cy="3723840"/>
+          </a:xfrm>
+          <a:prstGeom prst="rect">
+            <a:avLst/>
+          </a:prstGeom>
+          <a:noFill/>
+          <a:ln>
+            <a:noFill/>
+          </a:ln>
+        </p:spPr>
+        <p:style>
+          <a:lnRef idx="0"/>
+          <a:fillRef idx="0"/>
+          <a:effectRef idx="0"/>
+          <a:fontRef idx="minor"/>
+        </p:style>
+        <p:txBody>
+          <a:bodyPr lIns="90000" rIns="90000" tIns="91440" bIns="91440"/>
+          <a:p>
+            <a:pPr>
+              <a:lnSpc>
+                <a:spcPct val="100000"/>
+              </a:lnSpc>
+            </a:pPr>
+            <a:r>
+              <a:rPr lang="en-AU" sz="3000" spc="-1" strike="noStrike">
+                <a:solidFill>
+                  <a:srgbClr val="000000"/>
+                </a:solidFill>
+                <a:uFill>
+                  <a:solidFill>
+                    <a:srgbClr val="ffffff"/>
+                  </a:solidFill>
+                </a:uFill>
+                <a:latin typeface="Arial"/>
+                <a:ea typeface="Arial"/>
+              </a:rPr>
+              <a:t>Complete the key pair checklist </a:t>
+            </a:r>
+            <a:endParaRPr/>
+          </a:p>
+          <a:p>
+            <a:pPr>
+              <a:lnSpc>
+                <a:spcPct val="100000"/>
+              </a:lnSpc>
+            </a:pPr>
+            <a:r>
+              <a:rPr lang="en-AU" sz="3000" spc="-1" strike="noStrike">
+                <a:solidFill>
+                  <a:srgbClr val="000000"/>
+                </a:solidFill>
+                <a:uFill>
+                  <a:solidFill>
+                    <a:srgbClr val="ffffff"/>
+                  </a:solidFill>
+                </a:uFill>
+                <a:latin typeface="Arial"/>
+                <a:ea typeface="Arial"/>
+              </a:rPr>
+              <a:t>(expected time 5 minutes)</a:t>
+            </a:r>
+            <a:endParaRPr/>
+          </a:p>
+        </p:txBody>
+      </p:sp>
+      <p:sp>
+        <p:nvSpPr>
+          <p:cNvPr id="77" name="CustomShape 3"/>
+          <p:cNvSpPr/>
+          <p:nvPr/>
+        </p:nvSpPr>
+        <p:spPr>
+          <a:xfrm>
+            <a:off x="0" y="0"/>
+            <a:ext cx="2998080" cy="2998080"/>
+          </a:xfrm>
+          <a:prstGeom prst="rect">
+            <a:avLst/>
+          </a:prstGeom>
+          <a:noFill/>
+          <a:ln>
+            <a:noFill/>
+          </a:ln>
+        </p:spPr>
+        <p:style>
+          <a:lnRef idx="0"/>
+          <a:fillRef idx="0"/>
+          <a:effectRef idx="0"/>
+          <a:fontRef idx="minor"/>
+        </p:style>
+        <p:txBody>
+          <a:bodyPr lIns="90000" rIns="90000" tIns="91440" bIns="91440" anchor="ctr"/>
+          <a:p>
+            <a:pPr>
+              <a:lnSpc>
+                <a:spcPct val="100000"/>
+              </a:lnSpc>
+            </a:pPr>
+            <a:r>
+              <a:rPr lang="en-AU" sz="1400" spc="-1" strike="noStrike">
+                <a:solidFill>
+                  <a:srgbClr val="000000"/>
+                </a:solidFill>
+                <a:uFill>
+                  <a:solidFill>
+                    <a:srgbClr val="ffffff"/>
+                  </a:solidFill>
+                </a:uFill>
+                <a:latin typeface="Arial"/>
+                <a:ea typeface="Arial"/>
+              </a:rPr>
+              <a:t> </a:t>
+            </a:r>
+            <a:endParaRPr/>
+          </a:p>
+        </p:txBody>
+      </p:sp>
+    </p:spTree>
+  </p:cSld>
+  <p:timing>
+    <p:tnLst>
+      <p:par>
+        <p:cTn id="3" dur="indefinite" restart="never" nodeType="tmRoot">
+          <p:childTnLst>
+            <p:seq>
+              <p:cTn id="4" nodeType="mainSeq"/>
+              <p:prevCondLst>
+                <p:cond delay="0" evt="onPrev">
+                  <p:tgtEl>
+                    <p:sldTgt/>
+                  </p:tgtEl>
+                </p:cond>
+              </p:prevCondLst>
+              <p:nextCondLst>
+                <p:cond delay="0" evt="onNext">
+                  <p:tgtEl>
+                    <p:sldTgt/>
+                  </p:tgtEl>
+                </p:cond>
+              </p:nextCondLst>
+            </p:seq>
+          </p:childTnLst>
+        </p:cTn>
+      </p:par>
+    </p:tnLst>
+  </p:timing>
+</p:sld>
+</file>
+
+<file path=ppt/slides/slide3.xml><?xml version="1.0" encoding="utf-8"?>
+<p:sld xmlns:a="http://schemas.openxmlformats.org/drawingml/2006/main" xmlns:p="http://schemas.openxmlformats.org/presentationml/2006/main" xmlns:r="http://schemas.openxmlformats.org/officeDocument/2006/relationships">
+  <p:cSld>
+    <p:spTree>
+      <p:nvGrpSpPr>
+        <p:cNvPr id="1" name=""/>
+        <p:cNvGrpSpPr/>
+        <p:nvPr/>
+      </p:nvGrpSpPr>
+      <p:grpSpPr>
+        <a:xfrm>
+          <a:off x="0" y="0"/>
+          <a:ext cx="0" cy="0"/>
+          <a:chOff x="0" y="0"/>
+          <a:chExt cx="0" cy="0"/>
+        </a:xfrm>
+      </p:grpSpPr>
+      <p:sp>
+        <p:nvSpPr>
+          <p:cNvPr id="78" name="CustomShape 1"/>
+          <p:cNvSpPr/>
+          <p:nvPr/>
+        </p:nvSpPr>
+        <p:spPr>
+          <a:xfrm>
+            <a:off x="457200" y="205920"/>
+            <a:ext cx="8227800" cy="855720"/>
           </a:xfrm>
           <a:prstGeom prst="rect">
             <a:avLst/>
@@ -1754,14 +3359,14 @@
       </p:sp>
       <p:sp>
         <p:nvSpPr>
-          <p:cNvPr id="40" name="CustomShape 2"/>
+          <p:cNvPr id="79" name="CustomShape 2"/>
           <p:cNvSpPr/>
           <p:nvPr/>
         </p:nvSpPr>
         <p:spPr>
           <a:xfrm>
             <a:off x="457200" y="1200240"/>
-            <a:ext cx="8228520" cy="3724560"/>
+            <a:ext cx="8227800" cy="3723840"/>
           </a:xfrm>
           <a:prstGeom prst="rect">
             <a:avLst/>
@@ -1803,7 +3408,7 @@
             <a:endParaRPr/>
           </a:p>
           <a:p>
-            <a:pPr marL="216000" indent="-215640">
+            <a:pPr marL="216000" indent="-214920">
               <a:lnSpc>
                 <a:spcPct val="120000"/>
               </a:lnSpc>
@@ -1828,7 +3433,7 @@
             <a:endParaRPr/>
           </a:p>
           <a:p>
-            <a:pPr marL="216000" indent="-215640">
+            <a:pPr marL="216000" indent="-214920">
               <a:lnSpc>
                 <a:spcPct val="120000"/>
               </a:lnSpc>
@@ -1853,7 +3458,7 @@
             <a:endParaRPr/>
           </a:p>
           <a:p>
-            <a:pPr marL="216000" indent="-215640">
+            <a:pPr marL="216000" indent="-214920">
               <a:lnSpc>
                 <a:spcPct val="120000"/>
               </a:lnSpc>
@@ -1878,7 +3483,7 @@
             <a:endParaRPr/>
           </a:p>
           <a:p>
-            <a:pPr marL="216000" indent="-215640">
+            <a:pPr marL="216000" indent="-214920">
               <a:lnSpc>
                 <a:spcPct val="120000"/>
               </a:lnSpc>
@@ -1903,7 +3508,7 @@
             <a:endParaRPr/>
           </a:p>
           <a:p>
-            <a:pPr marL="216000" indent="-215640">
+            <a:pPr marL="216000" indent="-214920">
               <a:lnSpc>
                 <a:spcPct val="115000"/>
               </a:lnSpc>
@@ -1942,10 +3547,466 @@
   <p:timing>
     <p:tnLst>
       <p:par>
-        <p:cTn id="3" dur="indefinite" restart="never" nodeType="tmRoot">
+        <p:cTn id="5" dur="indefinite" restart="never" nodeType="tmRoot">
           <p:childTnLst>
             <p:seq>
-              <p:cTn id="4" nodeType="mainSeq"/>
+              <p:cTn id="6" nodeType="mainSeq"/>
+              <p:prevCondLst>
+                <p:cond delay="0" evt="onPrev">
+                  <p:tgtEl>
+                    <p:sldTgt/>
+                  </p:tgtEl>
+                </p:cond>
+              </p:prevCondLst>
+              <p:nextCondLst>
+                <p:cond delay="0" evt="onNext">
+                  <p:tgtEl>
+                    <p:sldTgt/>
+                  </p:tgtEl>
+                </p:cond>
+              </p:nextCondLst>
+            </p:seq>
+          </p:childTnLst>
+        </p:cTn>
+      </p:par>
+    </p:tnLst>
+  </p:timing>
+</p:sld>
+</file>
+
+<file path=ppt/slides/slide4.xml><?xml version="1.0" encoding="utf-8"?>
+<p:sld xmlns:a="http://schemas.openxmlformats.org/drawingml/2006/main" xmlns:p="http://schemas.openxmlformats.org/presentationml/2006/main" xmlns:r="http://schemas.openxmlformats.org/officeDocument/2006/relationships">
+  <p:cSld>
+    <p:spTree>
+      <p:nvGrpSpPr>
+        <p:cNvPr id="1" name=""/>
+        <p:cNvGrpSpPr/>
+        <p:nvPr/>
+      </p:nvGrpSpPr>
+      <p:grpSpPr>
+        <a:xfrm>
+          <a:off x="0" y="0"/>
+          <a:ext cx="0" cy="0"/>
+          <a:chOff x="0" y="0"/>
+          <a:chExt cx="0" cy="0"/>
+        </a:xfrm>
+      </p:grpSpPr>
+      <p:sp>
+        <p:nvSpPr>
+          <p:cNvPr id="80" name="CustomShape 1"/>
+          <p:cNvSpPr/>
+          <p:nvPr/>
+        </p:nvSpPr>
+        <p:spPr>
+          <a:xfrm>
+            <a:off x="457200" y="205920"/>
+            <a:ext cx="8227800" cy="855720"/>
+          </a:xfrm>
+          <a:prstGeom prst="rect">
+            <a:avLst/>
+          </a:prstGeom>
+          <a:noFill/>
+          <a:ln>
+            <a:noFill/>
+          </a:ln>
+        </p:spPr>
+        <p:style>
+          <a:lnRef idx="0"/>
+          <a:fillRef idx="0"/>
+          <a:effectRef idx="0"/>
+          <a:fontRef idx="minor"/>
+        </p:style>
+        <p:txBody>
+          <a:bodyPr lIns="90000" rIns="90000" tIns="91440" bIns="91440" anchor="b"/>
+          <a:p>
+            <a:pPr>
+              <a:lnSpc>
+                <a:spcPct val="100000"/>
+              </a:lnSpc>
+            </a:pPr>
+            <a:r>
+              <a:rPr b="1" lang="en-AU" sz="3600" spc="-1" strike="noStrike">
+                <a:solidFill>
+                  <a:srgbClr val="000000"/>
+                </a:solidFill>
+                <a:uFill>
+                  <a:solidFill>
+                    <a:srgbClr val="ffffff"/>
+                  </a:solidFill>
+                </a:uFill>
+                <a:latin typeface="Arial"/>
+                <a:ea typeface="Arial"/>
+              </a:rPr>
+              <a:t>Security Groups</a:t>
+            </a:r>
+            <a:endParaRPr/>
+          </a:p>
+        </p:txBody>
+      </p:sp>
+      <p:sp>
+        <p:nvSpPr>
+          <p:cNvPr id="81" name="CustomShape 2"/>
+          <p:cNvSpPr/>
+          <p:nvPr/>
+        </p:nvSpPr>
+        <p:spPr>
+          <a:xfrm>
+            <a:off x="457200" y="1200240"/>
+            <a:ext cx="8227800" cy="3723840"/>
+          </a:xfrm>
+          <a:prstGeom prst="rect">
+            <a:avLst/>
+          </a:prstGeom>
+          <a:noFill/>
+          <a:ln>
+            <a:noFill/>
+          </a:ln>
+        </p:spPr>
+        <p:style>
+          <a:lnRef idx="0"/>
+          <a:fillRef idx="0"/>
+          <a:effectRef idx="0"/>
+          <a:fontRef idx="minor"/>
+        </p:style>
+        <p:txBody>
+          <a:bodyPr lIns="90000" rIns="90000" tIns="91440" bIns="91440"/>
+          <a:p>
+            <a:pPr>
+              <a:lnSpc>
+                <a:spcPct val="100000"/>
+              </a:lnSpc>
+            </a:pPr>
+            <a:r>
+              <a:rPr lang="en-AU" sz="3000" spc="-1" strike="noStrike">
+                <a:solidFill>
+                  <a:srgbClr val="000000"/>
+                </a:solidFill>
+                <a:uFill>
+                  <a:solidFill>
+                    <a:srgbClr val="ffffff"/>
+                  </a:solidFill>
+                </a:uFill>
+                <a:latin typeface="Arial"/>
+                <a:ea typeface="Arial"/>
+              </a:rPr>
+              <a:t>Complete the security group checklist </a:t>
+            </a:r>
+            <a:endParaRPr/>
+          </a:p>
+          <a:p>
+            <a:pPr>
+              <a:lnSpc>
+                <a:spcPct val="100000"/>
+              </a:lnSpc>
+            </a:pPr>
+            <a:r>
+              <a:rPr lang="en-AU" sz="3000" spc="-1" strike="noStrike">
+                <a:solidFill>
+                  <a:srgbClr val="000000"/>
+                </a:solidFill>
+                <a:uFill>
+                  <a:solidFill>
+                    <a:srgbClr val="ffffff"/>
+                  </a:solidFill>
+                </a:uFill>
+                <a:latin typeface="Arial"/>
+                <a:ea typeface="Arial"/>
+              </a:rPr>
+              <a:t>(expected time 7 minutes)</a:t>
+            </a:r>
+            <a:endParaRPr/>
+          </a:p>
+        </p:txBody>
+      </p:sp>
+      <p:sp>
+        <p:nvSpPr>
+          <p:cNvPr id="82" name="CustomShape 3"/>
+          <p:cNvSpPr/>
+          <p:nvPr/>
+        </p:nvSpPr>
+        <p:spPr>
+          <a:xfrm>
+            <a:off x="0" y="0"/>
+            <a:ext cx="2998080" cy="2998080"/>
+          </a:xfrm>
+          <a:prstGeom prst="rect">
+            <a:avLst/>
+          </a:prstGeom>
+          <a:noFill/>
+          <a:ln>
+            <a:noFill/>
+          </a:ln>
+        </p:spPr>
+        <p:style>
+          <a:lnRef idx="0"/>
+          <a:fillRef idx="0"/>
+          <a:effectRef idx="0"/>
+          <a:fontRef idx="minor"/>
+        </p:style>
+        <p:txBody>
+          <a:bodyPr lIns="90000" rIns="90000" tIns="91440" bIns="91440" anchor="ctr"/>
+          <a:p>
+            <a:pPr>
+              <a:lnSpc>
+                <a:spcPct val="100000"/>
+              </a:lnSpc>
+            </a:pPr>
+            <a:r>
+              <a:rPr lang="en-AU" sz="1400" spc="-1" strike="noStrike">
+                <a:solidFill>
+                  <a:srgbClr val="000000"/>
+                </a:solidFill>
+                <a:uFill>
+                  <a:solidFill>
+                    <a:srgbClr val="ffffff"/>
+                  </a:solidFill>
+                </a:uFill>
+                <a:latin typeface="Arial"/>
+                <a:ea typeface="Arial"/>
+              </a:rPr>
+              <a:t> </a:t>
+            </a:r>
+            <a:endParaRPr/>
+          </a:p>
+        </p:txBody>
+      </p:sp>
+    </p:spTree>
+  </p:cSld>
+  <p:timing>
+    <p:tnLst>
+      <p:par>
+        <p:cTn id="7" dur="indefinite" restart="never" nodeType="tmRoot">
+          <p:childTnLst>
+            <p:seq>
+              <p:cTn id="8" nodeType="mainSeq"/>
+              <p:prevCondLst>
+                <p:cond delay="0" evt="onPrev">
+                  <p:tgtEl>
+                    <p:sldTgt/>
+                  </p:tgtEl>
+                </p:cond>
+              </p:prevCondLst>
+              <p:nextCondLst>
+                <p:cond delay="0" evt="onNext">
+                  <p:tgtEl>
+                    <p:sldTgt/>
+                  </p:tgtEl>
+                </p:cond>
+              </p:nextCondLst>
+            </p:seq>
+          </p:childTnLst>
+        </p:cTn>
+      </p:par>
+    </p:tnLst>
+  </p:timing>
+</p:sld>
+</file>
+
+<file path=ppt/slides/slide5.xml><?xml version="1.0" encoding="utf-8"?>
+<p:sld xmlns:a="http://schemas.openxmlformats.org/drawingml/2006/main" xmlns:p="http://schemas.openxmlformats.org/presentationml/2006/main" xmlns:r="http://schemas.openxmlformats.org/officeDocument/2006/relationships">
+  <p:cSld>
+    <p:spTree>
+      <p:nvGrpSpPr>
+        <p:cNvPr id="1" name=""/>
+        <p:cNvGrpSpPr/>
+        <p:nvPr/>
+      </p:nvGrpSpPr>
+      <p:grpSpPr>
+        <a:xfrm>
+          <a:off x="0" y="0"/>
+          <a:ext cx="0" cy="0"/>
+          <a:chOff x="0" y="0"/>
+          <a:chExt cx="0" cy="0"/>
+        </a:xfrm>
+      </p:grpSpPr>
+      <p:sp>
+        <p:nvSpPr>
+          <p:cNvPr id="83" name="CustomShape 1"/>
+          <p:cNvSpPr/>
+          <p:nvPr/>
+        </p:nvSpPr>
+        <p:spPr>
+          <a:xfrm>
+            <a:off x="457200" y="205920"/>
+            <a:ext cx="8227800" cy="855720"/>
+          </a:xfrm>
+          <a:prstGeom prst="rect">
+            <a:avLst/>
+          </a:prstGeom>
+          <a:noFill/>
+          <a:ln>
+            <a:noFill/>
+          </a:ln>
+        </p:spPr>
+        <p:style>
+          <a:lnRef idx="0"/>
+          <a:fillRef idx="0"/>
+          <a:effectRef idx="0"/>
+          <a:fontRef idx="minor"/>
+        </p:style>
+        <p:txBody>
+          <a:bodyPr lIns="90000" rIns="90000" tIns="91440" bIns="91440" anchor="b"/>
+          <a:p>
+            <a:pPr>
+              <a:lnSpc>
+                <a:spcPct val="100000"/>
+              </a:lnSpc>
+            </a:pPr>
+            <a:r>
+              <a:rPr b="1" lang="en-AU" sz="3600" spc="-1" strike="noStrike">
+                <a:solidFill>
+                  <a:srgbClr val="000000"/>
+                </a:solidFill>
+                <a:uFill>
+                  <a:solidFill>
+                    <a:srgbClr val="ffffff"/>
+                  </a:solidFill>
+                </a:uFill>
+                <a:latin typeface="Arial"/>
+                <a:ea typeface="Arial"/>
+              </a:rPr>
+              <a:t>Launch an Instance</a:t>
+            </a:r>
+            <a:endParaRPr/>
+          </a:p>
+        </p:txBody>
+      </p:sp>
+      <p:sp>
+        <p:nvSpPr>
+          <p:cNvPr id="84" name="CustomShape 2"/>
+          <p:cNvSpPr/>
+          <p:nvPr/>
+        </p:nvSpPr>
+        <p:spPr>
+          <a:xfrm>
+            <a:off x="457200" y="1200240"/>
+            <a:ext cx="8227800" cy="3723840"/>
+          </a:xfrm>
+          <a:prstGeom prst="rect">
+            <a:avLst/>
+          </a:prstGeom>
+          <a:noFill/>
+          <a:ln>
+            <a:noFill/>
+          </a:ln>
+        </p:spPr>
+        <p:style>
+          <a:lnRef idx="0"/>
+          <a:fillRef idx="0"/>
+          <a:effectRef idx="0"/>
+          <a:fontRef idx="minor"/>
+        </p:style>
+        <p:txBody>
+          <a:bodyPr lIns="90000" rIns="90000" tIns="91440" bIns="91440"/>
+          <a:p>
+            <a:pPr>
+              <a:lnSpc>
+                <a:spcPct val="100000"/>
+              </a:lnSpc>
+            </a:pPr>
+            <a:r>
+              <a:rPr lang="en-AU" sz="3000" spc="-1" strike="noStrike">
+                <a:solidFill>
+                  <a:srgbClr val="000000"/>
+                </a:solidFill>
+                <a:uFill>
+                  <a:solidFill>
+                    <a:srgbClr val="ffffff"/>
+                  </a:solidFill>
+                </a:uFill>
+                <a:latin typeface="Arial"/>
+                <a:ea typeface="Arial"/>
+              </a:rPr>
+              <a:t>Complete the launch an instance checklist. </a:t>
+            </a:r>
+            <a:endParaRPr/>
+          </a:p>
+          <a:p>
+            <a:pPr>
+              <a:lnSpc>
+                <a:spcPct val="100000"/>
+              </a:lnSpc>
+            </a:pPr>
+            <a:r>
+              <a:rPr lang="en-AU" sz="3000" spc="-1" strike="noStrike">
+                <a:solidFill>
+                  <a:srgbClr val="000000"/>
+                </a:solidFill>
+                <a:uFill>
+                  <a:solidFill>
+                    <a:srgbClr val="ffffff"/>
+                  </a:solidFill>
+                </a:uFill>
+                <a:latin typeface="Arial"/>
+                <a:ea typeface="Arial"/>
+              </a:rPr>
+              <a:t>(expected time 15 minutes)</a:t>
+            </a:r>
+            <a:endParaRPr/>
+          </a:p>
+        </p:txBody>
+      </p:sp>
+      <p:sp>
+        <p:nvSpPr>
+          <p:cNvPr id="85" name="CustomShape 3"/>
+          <p:cNvSpPr/>
+          <p:nvPr/>
+        </p:nvSpPr>
+        <p:spPr>
+          <a:xfrm>
+            <a:off x="0" y="0"/>
+            <a:ext cx="2998080" cy="2998080"/>
+          </a:xfrm>
+          <a:prstGeom prst="rect">
+            <a:avLst/>
+          </a:prstGeom>
+          <a:noFill/>
+          <a:ln>
+            <a:noFill/>
+          </a:ln>
+        </p:spPr>
+        <p:style>
+          <a:lnRef idx="0"/>
+          <a:fillRef idx="0"/>
+          <a:effectRef idx="0"/>
+          <a:fontRef idx="minor"/>
+        </p:style>
+        <p:txBody>
+          <a:bodyPr lIns="90000" rIns="90000" tIns="91440" bIns="91440" anchor="ctr"/>
+          <a:p>
+            <a:pPr>
+              <a:lnSpc>
+                <a:spcPct val="100000"/>
+              </a:lnSpc>
+            </a:pPr>
+            <a:r>
+              <a:rPr lang="en-AU" sz="1400" spc="-1" strike="noStrike">
+                <a:solidFill>
+                  <a:srgbClr val="000000"/>
+                </a:solidFill>
+                <a:uFill>
+                  <a:solidFill>
+                    <a:srgbClr val="ffffff"/>
+                  </a:solidFill>
+                </a:uFill>
+                <a:latin typeface="Arial"/>
+                <a:ea typeface="Arial"/>
+              </a:rPr>
+              <a:t> </a:t>
+            </a:r>
+            <a:endParaRPr/>
+          </a:p>
+        </p:txBody>
+      </p:sp>
+    </p:spTree>
+  </p:cSld>
+  <p:timing>
+    <p:tnLst>
+      <p:par>
+        <p:cTn id="9" dur="indefinite" restart="never" nodeType="tmRoot">
+          <p:childTnLst>
+            <p:seq>
+              <p:cTn id="10" nodeType="mainSeq"/>
               <p:prevCondLst>
                 <p:cond delay="0" evt="onPrev">
                   <p:tgtEl>
@@ -2190,4 +4251,227 @@
     </a:fmtScheme>
   </a:themeElements>
 </a:theme>
+</file>
+
+<file path=ppt/theme/theme2.xml><?xml version="1.0" encoding="utf-8"?>
+<a:theme xmlns:a="http://schemas.openxmlformats.org/drawingml/2006/main" name="Office Theme">
+  <a:themeElements>
+    <a:clrScheme name="Office">
+      <a:dk1>
+        <a:sysClr val="windowText" lastClr="000000"/>
+      </a:dk1>
+      <a:lt1>
+        <a:sysClr val="window" lastClr="FFFFFF"/>
+      </a:lt1>
+      <a:dk2>
+        <a:srgbClr val="1F497D"/>
+      </a:dk2>
+      <a:lt2>
+        <a:srgbClr val="EEECE1"/>
+      </a:lt2>
+      <a:accent1>
+        <a:srgbClr val="4F81BD"/>
+      </a:accent1>
+      <a:accent2>
+        <a:srgbClr val="C0504D"/>
+      </a:accent2>
+      <a:accent3>
+        <a:srgbClr val="9BBB59"/>
+      </a:accent3>
+      <a:accent4>
+        <a:srgbClr val="8064A2"/>
+      </a:accent4>
+      <a:accent5>
+        <a:srgbClr val="4BACC6"/>
+      </a:accent5>
+      <a:accent6>
+        <a:srgbClr val="F79646"/>
+      </a:accent6>
+      <a:hlink>
+        <a:srgbClr val="0000FF"/>
+      </a:hlink>
+      <a:folHlink>
+        <a:srgbClr val="800080"/>
+      </a:folHlink>
+    </a:clrScheme>
+    <a:fontScheme name="Office">
+      <a:majorFont>
+        <a:latin typeface="Arial"/>
+        <a:ea typeface="DejaVu Sans"/>
+        <a:cs typeface="DejaVu Sans"/>
+      </a:majorFont>
+      <a:minorFont>
+        <a:latin typeface="Arial"/>
+        <a:ea typeface="DejaVu Sans"/>
+        <a:cs typeface="DejaVu Sans"/>
+      </a:minorFont>
+    </a:fontScheme>
+    <a:fmtScheme name="Office">
+      <a:fillStyleLst>
+        <a:solidFill>
+          <a:schemeClr val="phClr"/>
+        </a:solidFill>
+        <a:gradFill rotWithShape="1">
+          <a:gsLst>
+            <a:gs pos="0">
+              <a:schemeClr val="phClr">
+                <a:tint val="50000"/>
+                <a:satMod val="300000"/>
+              </a:schemeClr>
+            </a:gs>
+            <a:gs pos="35000">
+              <a:schemeClr val="phClr">
+                <a:tint val="37000"/>
+                <a:satMod val="300000"/>
+              </a:schemeClr>
+            </a:gs>
+            <a:gs pos="100000">
+              <a:schemeClr val="phClr">
+                <a:tint val="15000"/>
+                <a:satMod val="350000"/>
+              </a:schemeClr>
+            </a:gs>
+          </a:gsLst>
+          <a:lin ang="16200000" scaled="1"/>
+        </a:gradFill>
+        <a:gradFill rotWithShape="1">
+          <a:gsLst>
+            <a:gs pos="0">
+              <a:schemeClr val="phClr">
+                <a:shade val="51000"/>
+                <a:satMod val="130000"/>
+              </a:schemeClr>
+            </a:gs>
+            <a:gs pos="80000">
+              <a:schemeClr val="phClr">
+                <a:shade val="93000"/>
+                <a:satMod val="130000"/>
+              </a:schemeClr>
+            </a:gs>
+            <a:gs pos="100000">
+              <a:schemeClr val="phClr">
+                <a:shade val="94000"/>
+                <a:satMod val="135000"/>
+              </a:schemeClr>
+            </a:gs>
+          </a:gsLst>
+          <a:lin ang="16200000" scaled="0"/>
+        </a:gradFill>
+      </a:fillStyleLst>
+      <a:lnStyleLst>
+        <a:ln w="9525" cap="flat" cmpd="sng" algn="ctr">
+          <a:solidFill>
+            <a:schemeClr val="phClr">
+              <a:shade val="95000"/>
+              <a:satMod val="105000"/>
+            </a:schemeClr>
+          </a:solidFill>
+          <a:prstDash val="solid"/>
+        </a:ln>
+        <a:ln w="25400" cap="flat" cmpd="sng" algn="ctr">
+          <a:solidFill>
+            <a:schemeClr val="phClr"/>
+          </a:solidFill>
+          <a:prstDash val="solid"/>
+        </a:ln>
+        <a:ln w="38100" cap="flat" cmpd="sng" algn="ctr">
+          <a:solidFill>
+            <a:schemeClr val="phClr"/>
+          </a:solidFill>
+          <a:prstDash val="solid"/>
+        </a:ln>
+      </a:lnStyleLst>
+      <a:effectStyleLst>
+        <a:effectStyle>
+          <a:effectLst>
+            <a:outerShdw blurRad="40000" dist="20000" dir="5400000" rotWithShape="0">
+              <a:srgbClr val="000000">
+                <a:alpha val="38000"/>
+              </a:srgbClr>
+            </a:outerShdw>
+          </a:effectLst>
+        </a:effectStyle>
+        <a:effectStyle>
+          <a:effectLst>
+            <a:outerShdw blurRad="40000" dist="23000" dir="5400000" rotWithShape="0">
+              <a:srgbClr val="000000">
+                <a:alpha val="35000"/>
+              </a:srgbClr>
+            </a:outerShdw>
+          </a:effectLst>
+        </a:effectStyle>
+        <a:effectStyle>
+          <a:effectLst>
+            <a:outerShdw blurRad="40000" dist="23000" dir="5400000" rotWithShape="0">
+              <a:srgbClr val="000000">
+                <a:alpha val="35000"/>
+              </a:srgbClr>
+            </a:outerShdw>
+          </a:effectLst>
+          <a:scene3d>
+            <a:camera prst="orthographicFront">
+              <a:rot lat="0" lon="0" rev="0"/>
+            </a:camera>
+            <a:lightRig rig="threePt" dir="t">
+              <a:rot lat="0" lon="0" rev="1200000"/>
+            </a:lightRig>
+          </a:scene3d>
+          <a:sp3d>
+            <a:bevelT w="63500" h="25400"/>
+          </a:sp3d>
+        </a:effectStyle>
+      </a:effectStyleLst>
+      <a:bgFillStyleLst>
+        <a:solidFill>
+          <a:schemeClr val="phClr"/>
+        </a:solidFill>
+        <a:gradFill rotWithShape="1">
+          <a:gsLst>
+            <a:gs pos="0">
+              <a:schemeClr val="phClr">
+                <a:tint val="40000"/>
+                <a:satMod val="350000"/>
+              </a:schemeClr>
+            </a:gs>
+            <a:gs pos="40000">
+              <a:schemeClr val="phClr">
+                <a:tint val="45000"/>
+                <a:shade val="99000"/>
+                <a:satMod val="350000"/>
+              </a:schemeClr>
+            </a:gs>
+            <a:gs pos="100000">
+              <a:schemeClr val="phClr">
+                <a:shade val="20000"/>
+                <a:satMod val="255000"/>
+              </a:schemeClr>
+            </a:gs>
+          </a:gsLst>
+          <a:path path="circle">
+            <a:fillToRect l="50000" t="-80000" r="50000" b="180000"/>
+          </a:path>
+        </a:gradFill>
+        <a:gradFill rotWithShape="1">
+          <a:gsLst>
+            <a:gs pos="0">
+              <a:schemeClr val="phClr">
+                <a:tint val="80000"/>
+                <a:satMod val="300000"/>
+              </a:schemeClr>
+            </a:gs>
+            <a:gs pos="100000">
+              <a:schemeClr val="phClr">
+                <a:shade val="30000"/>
+                <a:satMod val="200000"/>
+              </a:schemeClr>
+            </a:gs>
+          </a:gsLst>
+          <a:path path="circle">
+            <a:fillToRect l="50000" t="50000" r="50000" b="50000"/>
+          </a:path>
+        </a:gradFill>
+      </a:bgFillStyleLst>
+    </a:fmtScheme>
+  </a:themeElements>
+</a:theme>
 </file>
</xml_diff>